<commit_message>
Started powerpoint, added example code.
</commit_message>
<xml_diff>
--- a/Session 7 - Python/Instructional Material/Session 7 – Python Pandas Data Wrangling.pptx
+++ b/Session 7 - Python/Instructional Material/Session 7 – Python Pandas Data Wrangling.pptx
@@ -8,7 +8,11 @@
   <p:sldIdLst>
     <p:sldId id="256" r:id="rId3"/>
     <p:sldId id="280" r:id="rId4"/>
-    <p:sldId id="375" r:id="rId5"/>
+    <p:sldId id="378" r:id="rId5"/>
+    <p:sldId id="376" r:id="rId6"/>
+    <p:sldId id="379" r:id="rId7"/>
+    <p:sldId id="377" r:id="rId8"/>
+    <p:sldId id="375" r:id="rId9"/>
   </p:sldIdLst>
   <p:sldSz cx="9144000" cy="6858000" type="screen4x3"/>
   <p:notesSz cx="6858000" cy="9144000"/>
@@ -305,7 +309,7 @@
           <a:p>
             <a:fld id="{547641E8-73DF-4AD2-848E-3103064331B1}" type="datetimeFigureOut">
               <a:rPr lang="en-US" smtClean="0"/>
-              <a:t>2/13/2020</a:t>
+              <a:t>9/21/2021</a:t>
             </a:fld>
             <a:endParaRPr lang="en-US"/>
           </a:p>
@@ -473,7 +477,7 @@
           <a:p>
             <a:fld id="{547641E8-73DF-4AD2-848E-3103064331B1}" type="datetimeFigureOut">
               <a:rPr lang="en-US" smtClean="0"/>
-              <a:t>2/13/2020</a:t>
+              <a:t>9/21/2021</a:t>
             </a:fld>
             <a:endParaRPr lang="en-US"/>
           </a:p>
@@ -651,7 +655,7 @@
           <a:p>
             <a:fld id="{547641E8-73DF-4AD2-848E-3103064331B1}" type="datetimeFigureOut">
               <a:rPr lang="en-US" smtClean="0"/>
-              <a:t>2/13/2020</a:t>
+              <a:t>9/21/2021</a:t>
             </a:fld>
             <a:endParaRPr lang="en-US"/>
           </a:p>
@@ -898,7 +902,7 @@
                 </a:solidFill>
               </a:rPr>
               <a:pPr/>
-              <a:t>2/13/2020</a:t>
+              <a:t>9/21/2021</a:t>
             </a:fld>
             <a:endParaRPr lang="en-US">
               <a:solidFill>
@@ -1098,7 +1102,7 @@
                 </a:solidFill>
               </a:rPr>
               <a:pPr/>
-              <a:t>2/13/2020</a:t>
+              <a:t>9/21/2021</a:t>
             </a:fld>
             <a:endParaRPr lang="en-US">
               <a:solidFill>
@@ -1375,7 +1379,7 @@
                 </a:solidFill>
               </a:rPr>
               <a:pPr/>
-              <a:t>2/13/2020</a:t>
+              <a:t>9/21/2021</a:t>
             </a:fld>
             <a:endParaRPr lang="en-US">
               <a:solidFill>
@@ -1692,7 +1696,7 @@
                 </a:solidFill>
               </a:rPr>
               <a:pPr/>
-              <a:t>2/13/2020</a:t>
+              <a:t>9/21/2021</a:t>
             </a:fld>
             <a:endParaRPr lang="en-US">
               <a:solidFill>
@@ -2143,7 +2147,7 @@
                 </a:solidFill>
               </a:rPr>
               <a:pPr/>
-              <a:t>2/13/2020</a:t>
+              <a:t>9/21/2021</a:t>
             </a:fld>
             <a:endParaRPr lang="en-US">
               <a:solidFill>
@@ -2292,7 +2296,7 @@
                 </a:solidFill>
               </a:rPr>
               <a:pPr/>
-              <a:t>2/13/2020</a:t>
+              <a:t>9/21/2021</a:t>
             </a:fld>
             <a:endParaRPr lang="en-US">
               <a:solidFill>
@@ -2419,7 +2423,7 @@
                 </a:solidFill>
               </a:rPr>
               <a:pPr/>
-              <a:t>2/13/2020</a:t>
+              <a:t>9/21/2021</a:t>
             </a:fld>
             <a:endParaRPr lang="en-US">
               <a:solidFill>
@@ -2726,7 +2730,7 @@
                 </a:solidFill>
               </a:rPr>
               <a:pPr/>
-              <a:t>2/13/2020</a:t>
+              <a:t>9/21/2021</a:t>
             </a:fld>
             <a:endParaRPr lang="en-US">
               <a:solidFill>
@@ -2919,7 +2923,7 @@
           <a:p>
             <a:fld id="{547641E8-73DF-4AD2-848E-3103064331B1}" type="datetimeFigureOut">
               <a:rPr lang="en-US" smtClean="0"/>
-              <a:t>2/13/2020</a:t>
+              <a:t>9/21/2021</a:t>
             </a:fld>
             <a:endParaRPr lang="en-US"/>
           </a:p>
@@ -3178,7 +3182,7 @@
                 </a:solidFill>
               </a:rPr>
               <a:pPr/>
-              <a:t>2/13/2020</a:t>
+              <a:t>9/21/2021</a:t>
             </a:fld>
             <a:endParaRPr lang="en-US">
               <a:solidFill>
@@ -3378,7 +3382,7 @@
                 </a:solidFill>
               </a:rPr>
               <a:pPr/>
-              <a:t>2/13/2020</a:t>
+              <a:t>9/21/2021</a:t>
             </a:fld>
             <a:endParaRPr lang="en-US">
               <a:solidFill>
@@ -3588,7 +3592,7 @@
                 </a:solidFill>
               </a:rPr>
               <a:pPr/>
-              <a:t>2/13/2020</a:t>
+              <a:t>9/21/2021</a:t>
             </a:fld>
             <a:endParaRPr lang="en-US">
               <a:solidFill>
@@ -3858,7 +3862,7 @@
           <a:p>
             <a:fld id="{547641E8-73DF-4AD2-848E-3103064331B1}" type="datetimeFigureOut">
               <a:rPr lang="en-US" smtClean="0"/>
-              <a:t>2/13/2020</a:t>
+              <a:t>9/21/2021</a:t>
             </a:fld>
             <a:endParaRPr lang="en-US"/>
           </a:p>
@@ -4143,7 +4147,7 @@
           <a:p>
             <a:fld id="{547641E8-73DF-4AD2-848E-3103064331B1}" type="datetimeFigureOut">
               <a:rPr lang="en-US" smtClean="0"/>
-              <a:t>2/13/2020</a:t>
+              <a:t>9/21/2021</a:t>
             </a:fld>
             <a:endParaRPr lang="en-US"/>
           </a:p>
@@ -4562,7 +4566,7 @@
           <a:p>
             <a:fld id="{547641E8-73DF-4AD2-848E-3103064331B1}" type="datetimeFigureOut">
               <a:rPr lang="en-US" smtClean="0"/>
-              <a:t>2/13/2020</a:t>
+              <a:t>9/21/2021</a:t>
             </a:fld>
             <a:endParaRPr lang="en-US"/>
           </a:p>
@@ -4679,7 +4683,7 @@
           <a:p>
             <a:fld id="{547641E8-73DF-4AD2-848E-3103064331B1}" type="datetimeFigureOut">
               <a:rPr lang="en-US" smtClean="0"/>
-              <a:t>2/13/2020</a:t>
+              <a:t>9/21/2021</a:t>
             </a:fld>
             <a:endParaRPr lang="en-US"/>
           </a:p>
@@ -4774,7 +4778,7 @@
           <a:p>
             <a:fld id="{547641E8-73DF-4AD2-848E-3103064331B1}" type="datetimeFigureOut">
               <a:rPr lang="en-US" smtClean="0"/>
-              <a:t>2/13/2020</a:t>
+              <a:t>9/21/2021</a:t>
             </a:fld>
             <a:endParaRPr lang="en-US"/>
           </a:p>
@@ -5049,7 +5053,7 @@
           <a:p>
             <a:fld id="{547641E8-73DF-4AD2-848E-3103064331B1}" type="datetimeFigureOut">
               <a:rPr lang="en-US" smtClean="0"/>
-              <a:t>2/13/2020</a:t>
+              <a:t>9/21/2021</a:t>
             </a:fld>
             <a:endParaRPr lang="en-US"/>
           </a:p>
@@ -5301,7 +5305,7 @@
           <a:p>
             <a:fld id="{547641E8-73DF-4AD2-848E-3103064331B1}" type="datetimeFigureOut">
               <a:rPr lang="en-US" smtClean="0"/>
-              <a:t>2/13/2020</a:t>
+              <a:t>9/21/2021</a:t>
             </a:fld>
             <a:endParaRPr lang="en-US"/>
           </a:p>
@@ -5515,7 +5519,7 @@
           <a:p>
             <a:fld id="{547641E8-73DF-4AD2-848E-3103064331B1}" type="datetimeFigureOut">
               <a:rPr lang="en-US" smtClean="0"/>
-              <a:t>2/13/2020</a:t>
+              <a:t>9/21/2021</a:t>
             </a:fld>
             <a:endParaRPr lang="en-US"/>
           </a:p>
@@ -6030,7 +6034,7 @@
                 </a:solidFill>
               </a:rPr>
               <a:pPr/>
-              <a:t>2/13/2020</a:t>
+              <a:t>9/21/2021</a:t>
             </a:fld>
             <a:endParaRPr lang="en-US">
               <a:solidFill>
@@ -6575,6 +6579,13 @@
             <a:pPr lvl="1"/>
             <a:r>
               <a:rPr lang="en-US" dirty="0"/>
+              <a:t>Introduction</a:t>
+            </a:r>
+          </a:p>
+          <a:p>
+            <a:pPr lvl="1"/>
+            <a:r>
+              <a:rPr lang="en-US" dirty="0"/>
               <a:t>Series</a:t>
             </a:r>
           </a:p>
@@ -6633,6 +6644,520 @@
 </file>
 
 <file path=ppt/slides/slide3.xml><?xml version="1.0" encoding="utf-8"?>
+<p:sld xmlns:a="http://schemas.openxmlformats.org/drawingml/2006/main" xmlns:r="http://schemas.openxmlformats.org/officeDocument/2006/relationships" xmlns:p="http://schemas.openxmlformats.org/presentationml/2006/main">
+  <p:cSld>
+    <p:bg>
+      <p:bgPr>
+        <a:blipFill dpi="0" rotWithShape="1">
+          <a:blip r:embed="rId2">
+            <a:lum/>
+          </a:blip>
+          <a:srcRect/>
+          <a:stretch>
+            <a:fillRect l="-10000" r="-10000"/>
+          </a:stretch>
+        </a:blipFill>
+        <a:effectLst/>
+      </p:bgPr>
+    </p:bg>
+    <p:spTree>
+      <p:nvGrpSpPr>
+        <p:cNvPr id="1" name=""/>
+        <p:cNvGrpSpPr/>
+        <p:nvPr/>
+      </p:nvGrpSpPr>
+      <p:grpSpPr>
+        <a:xfrm>
+          <a:off x="0" y="0"/>
+          <a:ext cx="0" cy="0"/>
+          <a:chOff x="0" y="0"/>
+          <a:chExt cx="0" cy="0"/>
+        </a:xfrm>
+      </p:grpSpPr>
+      <p:sp>
+        <p:nvSpPr>
+          <p:cNvPr id="2" name="Title 1"/>
+          <p:cNvSpPr>
+            <a:spLocks noGrp="1"/>
+          </p:cNvSpPr>
+          <p:nvPr>
+            <p:ph type="title"/>
+          </p:nvPr>
+        </p:nvSpPr>
+        <p:spPr/>
+        <p:txBody>
+          <a:bodyPr/>
+          <a:lstStyle/>
+          <a:p>
+            <a:r>
+              <a:rPr lang="en-US" dirty="0"/>
+              <a:t>Introduction</a:t>
+            </a:r>
+          </a:p>
+        </p:txBody>
+      </p:sp>
+      <p:sp>
+        <p:nvSpPr>
+          <p:cNvPr id="3" name="Content Placeholder 2"/>
+          <p:cNvSpPr>
+            <a:spLocks noGrp="1"/>
+          </p:cNvSpPr>
+          <p:nvPr>
+            <p:ph idx="1"/>
+          </p:nvPr>
+        </p:nvSpPr>
+        <p:spPr/>
+        <p:txBody>
+          <a:bodyPr/>
+          <a:lstStyle/>
+          <a:p>
+            <a:r>
+              <a:rPr lang="en-US" dirty="0"/>
+              <a:t>Pandas</a:t>
+            </a:r>
+          </a:p>
+          <a:p>
+            <a:pPr lvl="1"/>
+            <a:r>
+              <a:rPr lang="en-US" dirty="0"/>
+              <a:t>Stores data in series or </a:t>
+            </a:r>
+            <a:r>
+              <a:rPr lang="en-US" dirty="0" err="1"/>
+              <a:t>dataframe</a:t>
+            </a:r>
+            <a:endParaRPr lang="en-US" dirty="0"/>
+          </a:p>
+          <a:p>
+            <a:pPr lvl="1"/>
+            <a:r>
+              <a:rPr lang="en-US" dirty="0"/>
+              <a:t>Uses </a:t>
+            </a:r>
+            <a:r>
+              <a:rPr lang="en-US" dirty="0" err="1"/>
+              <a:t>numpy</a:t>
+            </a:r>
+            <a:r>
+              <a:rPr lang="en-US" dirty="0"/>
+              <a:t> under the hood</a:t>
+            </a:r>
+          </a:p>
+          <a:p>
+            <a:pPr lvl="2"/>
+            <a:r>
+              <a:rPr lang="en-US" dirty="0"/>
+              <a:t>Has </a:t>
+            </a:r>
+            <a:r>
+              <a:rPr lang="en-US" dirty="0" err="1"/>
+              <a:t>numpy</a:t>
+            </a:r>
+            <a:r>
+              <a:rPr lang="en-US" dirty="0"/>
+              <a:t> datatypes</a:t>
+            </a:r>
+          </a:p>
+          <a:p>
+            <a:pPr lvl="1"/>
+            <a:r>
+              <a:rPr lang="en-US" dirty="0"/>
+              <a:t>Allows SQL-like functionality</a:t>
+            </a:r>
+          </a:p>
+          <a:p>
+            <a:pPr lvl="2"/>
+            <a:r>
+              <a:rPr lang="en-US" dirty="0"/>
+              <a:t>Join datasets</a:t>
+            </a:r>
+          </a:p>
+          <a:p>
+            <a:pPr lvl="2"/>
+            <a:r>
+              <a:rPr lang="en-US" dirty="0"/>
+              <a:t>Union datasets</a:t>
+            </a:r>
+          </a:p>
+          <a:p>
+            <a:pPr lvl="2"/>
+            <a:r>
+              <a:rPr lang="en-US" dirty="0"/>
+              <a:t>Filter datasets</a:t>
+            </a:r>
+          </a:p>
+          <a:p>
+            <a:endParaRPr lang="en-US" dirty="0"/>
+          </a:p>
+        </p:txBody>
+      </p:sp>
+    </p:spTree>
+    <p:extLst>
+      <p:ext uri="{BB962C8B-B14F-4D97-AF65-F5344CB8AC3E}">
+        <p14:creationId xmlns:p14="http://schemas.microsoft.com/office/powerpoint/2010/main" val="1144734392"/>
+      </p:ext>
+    </p:extLst>
+  </p:cSld>
+  <p:clrMapOvr>
+    <a:masterClrMapping/>
+  </p:clrMapOvr>
+</p:sld>
+</file>
+
+<file path=ppt/slides/slide4.xml><?xml version="1.0" encoding="utf-8"?>
+<p:sld xmlns:a="http://schemas.openxmlformats.org/drawingml/2006/main" xmlns:r="http://schemas.openxmlformats.org/officeDocument/2006/relationships" xmlns:p="http://schemas.openxmlformats.org/presentationml/2006/main">
+  <p:cSld>
+    <p:bg>
+      <p:bgPr>
+        <a:blipFill dpi="0" rotWithShape="1">
+          <a:blip r:embed="rId2">
+            <a:lum/>
+          </a:blip>
+          <a:srcRect/>
+          <a:stretch>
+            <a:fillRect l="-10000" r="-10000"/>
+          </a:stretch>
+        </a:blipFill>
+        <a:effectLst/>
+      </p:bgPr>
+    </p:bg>
+    <p:spTree>
+      <p:nvGrpSpPr>
+        <p:cNvPr id="1" name=""/>
+        <p:cNvGrpSpPr/>
+        <p:nvPr/>
+      </p:nvGrpSpPr>
+      <p:grpSpPr>
+        <a:xfrm>
+          <a:off x="0" y="0"/>
+          <a:ext cx="0" cy="0"/>
+          <a:chOff x="0" y="0"/>
+          <a:chExt cx="0" cy="0"/>
+        </a:xfrm>
+      </p:grpSpPr>
+      <p:sp>
+        <p:nvSpPr>
+          <p:cNvPr id="2" name="Title 1"/>
+          <p:cNvSpPr>
+            <a:spLocks noGrp="1"/>
+          </p:cNvSpPr>
+          <p:nvPr>
+            <p:ph type="title"/>
+          </p:nvPr>
+        </p:nvSpPr>
+        <p:spPr/>
+        <p:txBody>
+          <a:bodyPr/>
+          <a:lstStyle/>
+          <a:p>
+            <a:r>
+              <a:rPr lang="en-US" dirty="0"/>
+              <a:t>Series</a:t>
+            </a:r>
+          </a:p>
+        </p:txBody>
+      </p:sp>
+      <p:sp>
+        <p:nvSpPr>
+          <p:cNvPr id="3" name="Content Placeholder 2"/>
+          <p:cNvSpPr>
+            <a:spLocks noGrp="1"/>
+          </p:cNvSpPr>
+          <p:nvPr>
+            <p:ph idx="1"/>
+          </p:nvPr>
+        </p:nvSpPr>
+        <p:spPr/>
+        <p:txBody>
+          <a:bodyPr/>
+          <a:lstStyle/>
+          <a:p>
+            <a:r>
+              <a:rPr lang="en-US" dirty="0"/>
+              <a:t>Single named column</a:t>
+            </a:r>
+          </a:p>
+          <a:p>
+            <a:r>
+              <a:rPr lang="en-US" dirty="0"/>
+              <a:t>Datatype</a:t>
+            </a:r>
+          </a:p>
+          <a:p>
+            <a:r>
+              <a:rPr lang="en-US" dirty="0"/>
+              <a:t>Multiple Rows</a:t>
+            </a:r>
+          </a:p>
+          <a:p>
+            <a:endParaRPr lang="en-US" dirty="0"/>
+          </a:p>
+        </p:txBody>
+      </p:sp>
+    </p:spTree>
+    <p:extLst>
+      <p:ext uri="{BB962C8B-B14F-4D97-AF65-F5344CB8AC3E}">
+        <p14:creationId xmlns:p14="http://schemas.microsoft.com/office/powerpoint/2010/main" val="4169991634"/>
+      </p:ext>
+    </p:extLst>
+  </p:cSld>
+  <p:clrMapOvr>
+    <a:masterClrMapping/>
+  </p:clrMapOvr>
+</p:sld>
+</file>
+
+<file path=ppt/slides/slide5.xml><?xml version="1.0" encoding="utf-8"?>
+<p:sld xmlns:a="http://schemas.openxmlformats.org/drawingml/2006/main" xmlns:r="http://schemas.openxmlformats.org/officeDocument/2006/relationships" xmlns:p="http://schemas.openxmlformats.org/presentationml/2006/main">
+  <p:cSld>
+    <p:bg>
+      <p:bgPr>
+        <a:blipFill dpi="0" rotWithShape="1">
+          <a:blip r:embed="rId2">
+            <a:lum/>
+          </a:blip>
+          <a:srcRect/>
+          <a:stretch>
+            <a:fillRect l="-10000" r="-10000"/>
+          </a:stretch>
+        </a:blipFill>
+        <a:effectLst/>
+      </p:bgPr>
+    </p:bg>
+    <p:spTree>
+      <p:nvGrpSpPr>
+        <p:cNvPr id="1" name=""/>
+        <p:cNvGrpSpPr/>
+        <p:nvPr/>
+      </p:nvGrpSpPr>
+      <p:grpSpPr>
+        <a:xfrm>
+          <a:off x="0" y="0"/>
+          <a:ext cx="0" cy="0"/>
+          <a:chOff x="0" y="0"/>
+          <a:chExt cx="0" cy="0"/>
+        </a:xfrm>
+      </p:grpSpPr>
+      <p:sp>
+        <p:nvSpPr>
+          <p:cNvPr id="2" name="Title 1"/>
+          <p:cNvSpPr>
+            <a:spLocks noGrp="1"/>
+          </p:cNvSpPr>
+          <p:nvPr>
+            <p:ph type="title"/>
+          </p:nvPr>
+        </p:nvSpPr>
+        <p:spPr/>
+        <p:txBody>
+          <a:bodyPr/>
+          <a:lstStyle/>
+          <a:p>
+            <a:r>
+              <a:rPr lang="en-US" dirty="0"/>
+              <a:t>Series</a:t>
+            </a:r>
+          </a:p>
+        </p:txBody>
+      </p:sp>
+      <p:sp>
+        <p:nvSpPr>
+          <p:cNvPr id="3" name="Content Placeholder 2"/>
+          <p:cNvSpPr>
+            <a:spLocks noGrp="1"/>
+          </p:cNvSpPr>
+          <p:nvPr>
+            <p:ph idx="1"/>
+          </p:nvPr>
+        </p:nvSpPr>
+        <p:spPr/>
+        <p:txBody>
+          <a:bodyPr/>
+          <a:lstStyle/>
+          <a:p>
+            <a:r>
+              <a:rPr lang="en-US" dirty="0"/>
+              <a:t>Single unnamed column</a:t>
+            </a:r>
+          </a:p>
+          <a:p>
+            <a:r>
+              <a:rPr lang="en-US" dirty="0"/>
+              <a:t>Series itself has name</a:t>
+            </a:r>
+          </a:p>
+          <a:p>
+            <a:r>
+              <a:rPr lang="en-US" dirty="0"/>
+              <a:t>Datatype</a:t>
+            </a:r>
+          </a:p>
+          <a:p>
+            <a:r>
+              <a:rPr lang="en-US" dirty="0"/>
+              <a:t>Multiple Rows</a:t>
+            </a:r>
+          </a:p>
+          <a:p>
+            <a:r>
+              <a:rPr lang="en-US" dirty="0"/>
+              <a:t>Index</a:t>
+            </a:r>
+          </a:p>
+          <a:p>
+            <a:endParaRPr lang="en-US" dirty="0"/>
+          </a:p>
+        </p:txBody>
+      </p:sp>
+    </p:spTree>
+    <p:extLst>
+      <p:ext uri="{BB962C8B-B14F-4D97-AF65-F5344CB8AC3E}">
+        <p14:creationId xmlns:p14="http://schemas.microsoft.com/office/powerpoint/2010/main" val="2118716633"/>
+      </p:ext>
+    </p:extLst>
+  </p:cSld>
+  <p:clrMapOvr>
+    <a:masterClrMapping/>
+  </p:clrMapOvr>
+</p:sld>
+</file>
+
+<file path=ppt/slides/slide6.xml><?xml version="1.0" encoding="utf-8"?>
+<p:sld xmlns:a="http://schemas.openxmlformats.org/drawingml/2006/main" xmlns:r="http://schemas.openxmlformats.org/officeDocument/2006/relationships" xmlns:p="http://schemas.openxmlformats.org/presentationml/2006/main">
+  <p:cSld>
+    <p:bg>
+      <p:bgPr>
+        <a:blipFill dpi="0" rotWithShape="1">
+          <a:blip r:embed="rId2">
+            <a:lum/>
+          </a:blip>
+          <a:srcRect/>
+          <a:stretch>
+            <a:fillRect l="-10000" r="-10000"/>
+          </a:stretch>
+        </a:blipFill>
+        <a:effectLst/>
+      </p:bgPr>
+    </p:bg>
+    <p:spTree>
+      <p:nvGrpSpPr>
+        <p:cNvPr id="1" name=""/>
+        <p:cNvGrpSpPr/>
+        <p:nvPr/>
+      </p:nvGrpSpPr>
+      <p:grpSpPr>
+        <a:xfrm>
+          <a:off x="0" y="0"/>
+          <a:ext cx="0" cy="0"/>
+          <a:chOff x="0" y="0"/>
+          <a:chExt cx="0" cy="0"/>
+        </a:xfrm>
+      </p:grpSpPr>
+      <p:sp>
+        <p:nvSpPr>
+          <p:cNvPr id="2" name="Title 1"/>
+          <p:cNvSpPr>
+            <a:spLocks noGrp="1"/>
+          </p:cNvSpPr>
+          <p:nvPr>
+            <p:ph type="title"/>
+          </p:nvPr>
+        </p:nvSpPr>
+        <p:spPr/>
+        <p:txBody>
+          <a:bodyPr/>
+          <a:lstStyle/>
+          <a:p>
+            <a:r>
+              <a:rPr lang="en-US" dirty="0" err="1"/>
+              <a:t>Dataframes</a:t>
+            </a:r>
+            <a:endParaRPr lang="en-US" dirty="0"/>
+          </a:p>
+        </p:txBody>
+      </p:sp>
+      <p:sp>
+        <p:nvSpPr>
+          <p:cNvPr id="3" name="Content Placeholder 2"/>
+          <p:cNvSpPr>
+            <a:spLocks noGrp="1"/>
+          </p:cNvSpPr>
+          <p:nvPr>
+            <p:ph idx="1"/>
+          </p:nvPr>
+        </p:nvSpPr>
+        <p:spPr/>
+        <p:txBody>
+          <a:bodyPr/>
+          <a:lstStyle/>
+          <a:p>
+            <a:r>
+              <a:rPr lang="en-US" dirty="0"/>
+              <a:t>Overview</a:t>
+            </a:r>
+          </a:p>
+          <a:p>
+            <a:pPr lvl="1"/>
+            <a:r>
+              <a:rPr lang="en-US" dirty="0"/>
+              <a:t>Series</a:t>
+            </a:r>
+          </a:p>
+          <a:p>
+            <a:pPr lvl="1"/>
+            <a:r>
+              <a:rPr lang="en-US" dirty="0" err="1"/>
+              <a:t>DataFrames</a:t>
+            </a:r>
+            <a:endParaRPr lang="en-US" dirty="0"/>
+          </a:p>
+          <a:p>
+            <a:pPr lvl="1"/>
+            <a:r>
+              <a:rPr lang="en-US" dirty="0"/>
+              <a:t>Grouping</a:t>
+            </a:r>
+          </a:p>
+          <a:p>
+            <a:pPr lvl="1"/>
+            <a:r>
+              <a:rPr lang="en-US" dirty="0"/>
+              <a:t>Indexing</a:t>
+            </a:r>
+          </a:p>
+          <a:p>
+            <a:pPr lvl="1"/>
+            <a:r>
+              <a:rPr lang="en-US" dirty="0"/>
+              <a:t>Merges</a:t>
+            </a:r>
+          </a:p>
+          <a:p>
+            <a:pPr lvl="1"/>
+            <a:r>
+              <a:rPr lang="en-US" dirty="0"/>
+              <a:t>Joins</a:t>
+            </a:r>
+          </a:p>
+          <a:p>
+            <a:endParaRPr lang="en-US" dirty="0"/>
+          </a:p>
+        </p:txBody>
+      </p:sp>
+    </p:spTree>
+    <p:extLst>
+      <p:ext uri="{BB962C8B-B14F-4D97-AF65-F5344CB8AC3E}">
+        <p14:creationId xmlns:p14="http://schemas.microsoft.com/office/powerpoint/2010/main" val="3349862262"/>
+      </p:ext>
+    </p:extLst>
+  </p:cSld>
+  <p:clrMapOvr>
+    <a:masterClrMapping/>
+  </p:clrMapOvr>
+</p:sld>
+</file>
+
+<file path=ppt/slides/slide7.xml><?xml version="1.0" encoding="utf-8"?>
 <p:sld xmlns:a="http://schemas.openxmlformats.org/drawingml/2006/main" xmlns:r="http://schemas.openxmlformats.org/officeDocument/2006/relationships" xmlns:p="http://schemas.openxmlformats.org/presentationml/2006/main">
   <p:cSld>
     <p:bg>

</xml_diff>

<commit_message>
Added material to powerpoint.
</commit_message>
<xml_diff>
--- a/Session 7 - Python/Instructional Material/Session 7 – Python Pandas Data Wrangling.pptx
+++ b/Session 7 - Python/Instructional Material/Session 7 – Python Pandas Data Wrangling.pptx
@@ -12,7 +12,11 @@
     <p:sldId id="376" r:id="rId6"/>
     <p:sldId id="379" r:id="rId7"/>
     <p:sldId id="377" r:id="rId8"/>
-    <p:sldId id="375" r:id="rId9"/>
+    <p:sldId id="380" r:id="rId9"/>
+    <p:sldId id="381" r:id="rId10"/>
+    <p:sldId id="382" r:id="rId11"/>
+    <p:sldId id="383" r:id="rId12"/>
+    <p:sldId id="375" r:id="rId13"/>
   </p:sldIdLst>
   <p:sldSz cx="9144000" cy="6858000" type="screen4x3"/>
   <p:notesSz cx="6858000" cy="9144000"/>
@@ -309,7 +313,7 @@
           <a:p>
             <a:fld id="{547641E8-73DF-4AD2-848E-3103064331B1}" type="datetimeFigureOut">
               <a:rPr lang="en-US" smtClean="0"/>
-              <a:t>9/21/2021</a:t>
+              <a:t>9/22/2021</a:t>
             </a:fld>
             <a:endParaRPr lang="en-US"/>
           </a:p>
@@ -477,7 +481,7 @@
           <a:p>
             <a:fld id="{547641E8-73DF-4AD2-848E-3103064331B1}" type="datetimeFigureOut">
               <a:rPr lang="en-US" smtClean="0"/>
-              <a:t>9/21/2021</a:t>
+              <a:t>9/22/2021</a:t>
             </a:fld>
             <a:endParaRPr lang="en-US"/>
           </a:p>
@@ -655,7 +659,7 @@
           <a:p>
             <a:fld id="{547641E8-73DF-4AD2-848E-3103064331B1}" type="datetimeFigureOut">
               <a:rPr lang="en-US" smtClean="0"/>
-              <a:t>9/21/2021</a:t>
+              <a:t>9/22/2021</a:t>
             </a:fld>
             <a:endParaRPr lang="en-US"/>
           </a:p>
@@ -902,7 +906,7 @@
                 </a:solidFill>
               </a:rPr>
               <a:pPr/>
-              <a:t>9/21/2021</a:t>
+              <a:t>9/22/2021</a:t>
             </a:fld>
             <a:endParaRPr lang="en-US">
               <a:solidFill>
@@ -1102,7 +1106,7 @@
                 </a:solidFill>
               </a:rPr>
               <a:pPr/>
-              <a:t>9/21/2021</a:t>
+              <a:t>9/22/2021</a:t>
             </a:fld>
             <a:endParaRPr lang="en-US">
               <a:solidFill>
@@ -1379,7 +1383,7 @@
                 </a:solidFill>
               </a:rPr>
               <a:pPr/>
-              <a:t>9/21/2021</a:t>
+              <a:t>9/22/2021</a:t>
             </a:fld>
             <a:endParaRPr lang="en-US">
               <a:solidFill>
@@ -1696,7 +1700,7 @@
                 </a:solidFill>
               </a:rPr>
               <a:pPr/>
-              <a:t>9/21/2021</a:t>
+              <a:t>9/22/2021</a:t>
             </a:fld>
             <a:endParaRPr lang="en-US">
               <a:solidFill>
@@ -2147,7 +2151,7 @@
                 </a:solidFill>
               </a:rPr>
               <a:pPr/>
-              <a:t>9/21/2021</a:t>
+              <a:t>9/22/2021</a:t>
             </a:fld>
             <a:endParaRPr lang="en-US">
               <a:solidFill>
@@ -2296,7 +2300,7 @@
                 </a:solidFill>
               </a:rPr>
               <a:pPr/>
-              <a:t>9/21/2021</a:t>
+              <a:t>9/22/2021</a:t>
             </a:fld>
             <a:endParaRPr lang="en-US">
               <a:solidFill>
@@ -2423,7 +2427,7 @@
                 </a:solidFill>
               </a:rPr>
               <a:pPr/>
-              <a:t>9/21/2021</a:t>
+              <a:t>9/22/2021</a:t>
             </a:fld>
             <a:endParaRPr lang="en-US">
               <a:solidFill>
@@ -2730,7 +2734,7 @@
                 </a:solidFill>
               </a:rPr>
               <a:pPr/>
-              <a:t>9/21/2021</a:t>
+              <a:t>9/22/2021</a:t>
             </a:fld>
             <a:endParaRPr lang="en-US">
               <a:solidFill>
@@ -2923,7 +2927,7 @@
           <a:p>
             <a:fld id="{547641E8-73DF-4AD2-848E-3103064331B1}" type="datetimeFigureOut">
               <a:rPr lang="en-US" smtClean="0"/>
-              <a:t>9/21/2021</a:t>
+              <a:t>9/22/2021</a:t>
             </a:fld>
             <a:endParaRPr lang="en-US"/>
           </a:p>
@@ -3182,7 +3186,7 @@
                 </a:solidFill>
               </a:rPr>
               <a:pPr/>
-              <a:t>9/21/2021</a:t>
+              <a:t>9/22/2021</a:t>
             </a:fld>
             <a:endParaRPr lang="en-US">
               <a:solidFill>
@@ -3382,7 +3386,7 @@
                 </a:solidFill>
               </a:rPr>
               <a:pPr/>
-              <a:t>9/21/2021</a:t>
+              <a:t>9/22/2021</a:t>
             </a:fld>
             <a:endParaRPr lang="en-US">
               <a:solidFill>
@@ -3592,7 +3596,7 @@
                 </a:solidFill>
               </a:rPr>
               <a:pPr/>
-              <a:t>9/21/2021</a:t>
+              <a:t>9/22/2021</a:t>
             </a:fld>
             <a:endParaRPr lang="en-US">
               <a:solidFill>
@@ -3862,7 +3866,7 @@
           <a:p>
             <a:fld id="{547641E8-73DF-4AD2-848E-3103064331B1}" type="datetimeFigureOut">
               <a:rPr lang="en-US" smtClean="0"/>
-              <a:t>9/21/2021</a:t>
+              <a:t>9/22/2021</a:t>
             </a:fld>
             <a:endParaRPr lang="en-US"/>
           </a:p>
@@ -4147,7 +4151,7 @@
           <a:p>
             <a:fld id="{547641E8-73DF-4AD2-848E-3103064331B1}" type="datetimeFigureOut">
               <a:rPr lang="en-US" smtClean="0"/>
-              <a:t>9/21/2021</a:t>
+              <a:t>9/22/2021</a:t>
             </a:fld>
             <a:endParaRPr lang="en-US"/>
           </a:p>
@@ -4566,7 +4570,7 @@
           <a:p>
             <a:fld id="{547641E8-73DF-4AD2-848E-3103064331B1}" type="datetimeFigureOut">
               <a:rPr lang="en-US" smtClean="0"/>
-              <a:t>9/21/2021</a:t>
+              <a:t>9/22/2021</a:t>
             </a:fld>
             <a:endParaRPr lang="en-US"/>
           </a:p>
@@ -4683,7 +4687,7 @@
           <a:p>
             <a:fld id="{547641E8-73DF-4AD2-848E-3103064331B1}" type="datetimeFigureOut">
               <a:rPr lang="en-US" smtClean="0"/>
-              <a:t>9/21/2021</a:t>
+              <a:t>9/22/2021</a:t>
             </a:fld>
             <a:endParaRPr lang="en-US"/>
           </a:p>
@@ -4778,7 +4782,7 @@
           <a:p>
             <a:fld id="{547641E8-73DF-4AD2-848E-3103064331B1}" type="datetimeFigureOut">
               <a:rPr lang="en-US" smtClean="0"/>
-              <a:t>9/21/2021</a:t>
+              <a:t>9/22/2021</a:t>
             </a:fld>
             <a:endParaRPr lang="en-US"/>
           </a:p>
@@ -5053,7 +5057,7 @@
           <a:p>
             <a:fld id="{547641E8-73DF-4AD2-848E-3103064331B1}" type="datetimeFigureOut">
               <a:rPr lang="en-US" smtClean="0"/>
-              <a:t>9/21/2021</a:t>
+              <a:t>9/22/2021</a:t>
             </a:fld>
             <a:endParaRPr lang="en-US"/>
           </a:p>
@@ -5305,7 +5309,7 @@
           <a:p>
             <a:fld id="{547641E8-73DF-4AD2-848E-3103064331B1}" type="datetimeFigureOut">
               <a:rPr lang="en-US" smtClean="0"/>
-              <a:t>9/21/2021</a:t>
+              <a:t>9/22/2021</a:t>
             </a:fld>
             <a:endParaRPr lang="en-US"/>
           </a:p>
@@ -5519,7 +5523,7 @@
           <a:p>
             <a:fld id="{547641E8-73DF-4AD2-848E-3103064331B1}" type="datetimeFigureOut">
               <a:rPr lang="en-US" smtClean="0"/>
-              <a:t>9/21/2021</a:t>
+              <a:t>9/22/2021</a:t>
             </a:fld>
             <a:endParaRPr lang="en-US"/>
           </a:p>
@@ -6034,7 +6038,7 @@
                 </a:solidFill>
               </a:rPr>
               <a:pPr/>
-              <a:t>9/21/2021</a:t>
+              <a:t>9/22/2021</a:t>
             </a:fld>
             <a:endParaRPr lang="en-US">
               <a:solidFill>
@@ -6458,7 +6462,12 @@
             <p:ph type="ctrTitle"/>
           </p:nvPr>
         </p:nvSpPr>
-        <p:spPr/>
+        <p:spPr>
+          <a:xfrm>
+            <a:off x="685800" y="990600"/>
+            <a:ext cx="7772400" cy="1470025"/>
+          </a:xfrm>
+        </p:spPr>
         <p:txBody>
           <a:bodyPr/>
           <a:lstStyle/>
@@ -6493,6 +6502,219 @@
     <p:extLst>
       <p:ext uri="{BB962C8B-B14F-4D97-AF65-F5344CB8AC3E}">
         <p14:creationId xmlns:p14="http://schemas.microsoft.com/office/powerpoint/2010/main" val="4188311388"/>
+      </p:ext>
+    </p:extLst>
+  </p:cSld>
+  <p:clrMapOvr>
+    <a:masterClrMapping/>
+  </p:clrMapOvr>
+</p:sld>
+</file>
+
+<file path=ppt/slides/slide10.xml><?xml version="1.0" encoding="utf-8"?>
+<p:sld xmlns:a="http://schemas.openxmlformats.org/drawingml/2006/main" xmlns:r="http://schemas.openxmlformats.org/officeDocument/2006/relationships" xmlns:p="http://schemas.openxmlformats.org/presentationml/2006/main">
+  <p:cSld>
+    <p:bg>
+      <p:bgPr>
+        <a:blipFill dpi="0" rotWithShape="1">
+          <a:blip r:embed="rId2">
+            <a:lum/>
+          </a:blip>
+          <a:srcRect/>
+          <a:stretch>
+            <a:fillRect l="-17000" r="-17000"/>
+          </a:stretch>
+        </a:blipFill>
+        <a:effectLst/>
+      </p:bgPr>
+    </p:bg>
+    <p:spTree>
+      <p:nvGrpSpPr>
+        <p:cNvPr id="1" name=""/>
+        <p:cNvGrpSpPr/>
+        <p:nvPr/>
+      </p:nvGrpSpPr>
+      <p:grpSpPr>
+        <a:xfrm>
+          <a:off x="0" y="0"/>
+          <a:ext cx="0" cy="0"/>
+          <a:chOff x="0" y="0"/>
+          <a:chExt cx="0" cy="0"/>
+        </a:xfrm>
+      </p:grpSpPr>
+      <p:sp>
+        <p:nvSpPr>
+          <p:cNvPr id="2" name="Title 1"/>
+          <p:cNvSpPr>
+            <a:spLocks noGrp="1"/>
+          </p:cNvSpPr>
+          <p:nvPr>
+            <p:ph type="title"/>
+          </p:nvPr>
+        </p:nvSpPr>
+        <p:spPr/>
+        <p:txBody>
+          <a:bodyPr/>
+          <a:lstStyle/>
+          <a:p>
+            <a:r>
+              <a:rPr lang="en-US" dirty="0"/>
+              <a:t>Concatenation (Unions)</a:t>
+            </a:r>
+          </a:p>
+        </p:txBody>
+      </p:sp>
+      <p:sp>
+        <p:nvSpPr>
+          <p:cNvPr id="3" name="Content Placeholder 2"/>
+          <p:cNvSpPr>
+            <a:spLocks noGrp="1"/>
+          </p:cNvSpPr>
+          <p:nvPr>
+            <p:ph idx="1"/>
+          </p:nvPr>
+        </p:nvSpPr>
+        <p:spPr/>
+        <p:txBody>
+          <a:bodyPr/>
+          <a:lstStyle/>
+          <a:p>
+            <a:r>
+              <a:rPr lang="en-US" dirty="0"/>
+              <a:t>Like SQL union</a:t>
+            </a:r>
+          </a:p>
+          <a:p>
+            <a:r>
+              <a:rPr lang="en-US" dirty="0"/>
+              <a:t>Puts one </a:t>
+            </a:r>
+            <a:r>
+              <a:rPr lang="en-US" dirty="0" err="1"/>
+              <a:t>DataFrame</a:t>
+            </a:r>
+            <a:r>
+              <a:rPr lang="en-US" dirty="0"/>
+              <a:t> on top of the other</a:t>
+            </a:r>
+          </a:p>
+          <a:p>
+            <a:endParaRPr lang="en-US" dirty="0"/>
+          </a:p>
+        </p:txBody>
+      </p:sp>
+    </p:spTree>
+    <p:extLst>
+      <p:ext uri="{BB962C8B-B14F-4D97-AF65-F5344CB8AC3E}">
+        <p14:creationId xmlns:p14="http://schemas.microsoft.com/office/powerpoint/2010/main" val="1720860325"/>
+      </p:ext>
+    </p:extLst>
+  </p:cSld>
+  <p:clrMapOvr>
+    <a:masterClrMapping/>
+  </p:clrMapOvr>
+</p:sld>
+</file>
+
+<file path=ppt/slides/slide11.xml><?xml version="1.0" encoding="utf-8"?>
+<p:sld xmlns:a="http://schemas.openxmlformats.org/drawingml/2006/main" xmlns:r="http://schemas.openxmlformats.org/officeDocument/2006/relationships" xmlns:p="http://schemas.openxmlformats.org/presentationml/2006/main">
+  <p:cSld>
+    <p:bg>
+      <p:bgPr>
+        <a:blipFill dpi="0" rotWithShape="1">
+          <a:blip r:embed="rId2">
+            <a:lum/>
+          </a:blip>
+          <a:srcRect/>
+          <a:stretch>
+            <a:fillRect l="-10000" r="-10000"/>
+          </a:stretch>
+        </a:blipFill>
+        <a:effectLst/>
+      </p:bgPr>
+    </p:bg>
+    <p:spTree>
+      <p:nvGrpSpPr>
+        <p:cNvPr id="1" name=""/>
+        <p:cNvGrpSpPr/>
+        <p:nvPr/>
+      </p:nvGrpSpPr>
+      <p:grpSpPr>
+        <a:xfrm>
+          <a:off x="0" y="0"/>
+          <a:ext cx="0" cy="0"/>
+          <a:chOff x="0" y="0"/>
+          <a:chExt cx="0" cy="0"/>
+        </a:xfrm>
+      </p:grpSpPr>
+      <p:sp>
+        <p:nvSpPr>
+          <p:cNvPr id="2" name="Title 1"/>
+          <p:cNvSpPr>
+            <a:spLocks noGrp="1"/>
+          </p:cNvSpPr>
+          <p:nvPr>
+            <p:ph type="title"/>
+          </p:nvPr>
+        </p:nvSpPr>
+        <p:spPr/>
+        <p:txBody>
+          <a:bodyPr/>
+          <a:lstStyle/>
+          <a:p>
+            <a:r>
+              <a:rPr lang="en-US" dirty="0"/>
+              <a:t>LICENSE</a:t>
+            </a:r>
+          </a:p>
+        </p:txBody>
+      </p:sp>
+      <p:sp>
+        <p:nvSpPr>
+          <p:cNvPr id="3" name="Content Placeholder 2"/>
+          <p:cNvSpPr>
+            <a:spLocks noGrp="1"/>
+          </p:cNvSpPr>
+          <p:nvPr>
+            <p:ph idx="1"/>
+          </p:nvPr>
+        </p:nvSpPr>
+        <p:spPr/>
+        <p:txBody>
+          <a:bodyPr>
+            <a:normAutofit fontScale="62500" lnSpcReduction="20000"/>
+          </a:bodyPr>
+          <a:lstStyle/>
+          <a:p>
+            <a:r>
+              <a:rPr lang="en-US" dirty="0"/>
+              <a:t>Copyright 2018 Douglas Bowman</a:t>
+            </a:r>
+          </a:p>
+          <a:p>
+            <a:r>
+              <a:rPr lang="en-US" dirty="0"/>
+              <a:t>Permission is hereby granted, free of charge, to any person obtaining a copy of this software and associated documentation files (the "Software"), to deal in the Software without restriction, including without limitation the rights to use, copy, modify, merge, publish, distribute, sublicense, and/or sell copies of the Software, and to permit persons to whom the Software is furnished to do so, subject to the following conditions:</a:t>
+            </a:r>
+          </a:p>
+          <a:p>
+            <a:r>
+              <a:rPr lang="en-US" dirty="0"/>
+              <a:t>The above copyright notice and this permission notice shall be included in all copies or substantial portions of the Software.</a:t>
+            </a:r>
+          </a:p>
+          <a:p>
+            <a:r>
+              <a:rPr lang="en-US" dirty="0"/>
+              <a:t>THE SOFTWARE IS PROVIDED "AS IS", WITHOUT WARRANTY OF ANY KIND, EXPRESS OR IMPLIED, INCLUDING BUT NOT LIMITED TO THE WARRANTIES OF MERCHANTABILITY, FITNESS FOR A PARTICULAR PURPOSE AND NONINFRINGEMENT. IN NO EVENT SHALL THE AUTHORS OR COPYRIGHT HOLDERS BE LIABLE FOR ANY CLAIM, DAMAGES OR OTHER LIABILITY, WHETHER IN AN ACTION OF CONTRACT, TORT OR OTHERWISE, ARISING FROM, OUT OF OR IN CONNECTION WITH THE SOFTWARE OR THE USE OR OTHER DEALINGS IN THE SOFTWARE.</a:t>
+            </a:r>
+          </a:p>
+        </p:txBody>
+      </p:sp>
+    </p:spTree>
+    <p:extLst>
+      <p:ext uri="{BB962C8B-B14F-4D97-AF65-F5344CB8AC3E}">
+        <p14:creationId xmlns:p14="http://schemas.microsoft.com/office/powerpoint/2010/main" val="3645036191"/>
       </p:ext>
     </p:extLst>
   </p:cSld>
@@ -6654,7 +6876,7 @@
           </a:blip>
           <a:srcRect/>
           <a:stretch>
-            <a:fillRect l="-10000" r="-10000"/>
+            <a:fillRect l="-17000" r="-17000"/>
           </a:stretch>
         </a:blipFill>
         <a:effectLst/>
@@ -6815,7 +7037,7 @@
           </a:blip>
           <a:srcRect/>
           <a:stretch>
-            <a:fillRect l="-10000" r="-10000"/>
+            <a:fillRect l="-17000" r="-17000"/>
           </a:stretch>
         </a:blipFill>
         <a:effectLst/>
@@ -6918,7 +7140,7 @@
           </a:blip>
           <a:srcRect/>
           <a:stretch>
-            <a:fillRect l="-10000" r="-10000"/>
+            <a:fillRect l="-17000" r="-17000"/>
           </a:stretch>
         </a:blipFill>
         <a:effectLst/>
@@ -7033,7 +7255,7 @@
           </a:blip>
           <a:srcRect/>
           <a:stretch>
-            <a:fillRect l="-10000" r="-10000"/>
+            <a:fillRect l="-17000" r="-17000"/>
           </a:stretch>
         </a:blipFill>
         <a:effectLst/>
@@ -7093,50 +7315,32 @@
           <a:p>
             <a:r>
               <a:rPr lang="en-US" dirty="0"/>
-              <a:t>Overview</a:t>
+              <a:t>Multiple columns</a:t>
+            </a:r>
+          </a:p>
+          <a:p>
+            <a:r>
+              <a:rPr lang="en-US" dirty="0"/>
+              <a:t>Each column has a datatype</a:t>
             </a:r>
           </a:p>
           <a:p>
             <a:pPr lvl="1"/>
             <a:r>
               <a:rPr lang="en-US" dirty="0"/>
-              <a:t>Series</a:t>
-            </a:r>
-          </a:p>
-          <a:p>
-            <a:pPr lvl="1"/>
-            <a:r>
-              <a:rPr lang="en-US" dirty="0" err="1"/>
-              <a:t>DataFrames</a:t>
-            </a:r>
-            <a:endParaRPr lang="en-US" dirty="0"/>
-          </a:p>
-          <a:p>
-            <a:pPr lvl="1"/>
+              <a:t>Like a database</a:t>
+            </a:r>
+          </a:p>
+          <a:p>
             <a:r>
               <a:rPr lang="en-US" dirty="0"/>
-              <a:t>Grouping</a:t>
-            </a:r>
-          </a:p>
-          <a:p>
-            <a:pPr lvl="1"/>
+              <a:t>Has index</a:t>
+            </a:r>
+          </a:p>
+          <a:p>
             <a:r>
               <a:rPr lang="en-US" dirty="0"/>
-              <a:t>Indexing</a:t>
-            </a:r>
-          </a:p>
-          <a:p>
-            <a:pPr lvl="1"/>
-            <a:r>
-              <a:rPr lang="en-US" dirty="0"/>
-              <a:t>Merges</a:t>
-            </a:r>
-          </a:p>
-          <a:p>
-            <a:pPr lvl="1"/>
-            <a:r>
-              <a:rPr lang="en-US" dirty="0"/>
-              <a:t>Joins</a:t>
+              <a:t>Multiple useful functions to manipulate data</a:t>
             </a:r>
           </a:p>
           <a:p>
@@ -7168,7 +7372,7 @@
           </a:blip>
           <a:srcRect/>
           <a:stretch>
-            <a:fillRect l="-10000" r="-10000"/>
+            <a:fillRect l="-17000" r="-17000"/>
           </a:stretch>
         </a:blipFill>
         <a:effectLst/>
@@ -7205,7 +7409,7 @@
           <a:p>
             <a:r>
               <a:rPr lang="en-US" dirty="0"/>
-              <a:t>LICENSE</a:t>
+              <a:t>Grouping</a:t>
             </a:r>
           </a:p>
         </p:txBody>
@@ -7222,40 +7426,299 @@
         </p:nvSpPr>
         <p:spPr/>
         <p:txBody>
-          <a:bodyPr>
-            <a:normAutofit fontScale="62500" lnSpcReduction="20000"/>
-          </a:bodyPr>
+          <a:bodyPr/>
           <a:lstStyle/>
           <a:p>
             <a:r>
               <a:rPr lang="en-US" dirty="0"/>
-              <a:t>Copyright 2018 Douglas Bowman</a:t>
-            </a:r>
-          </a:p>
-          <a:p>
+              <a:t>Group data with a common identifier together</a:t>
+            </a:r>
+          </a:p>
+          <a:p>
+            <a:pPr lvl="1"/>
             <a:r>
               <a:rPr lang="en-US" dirty="0"/>
-              <a:t>Permission is hereby granted, free of charge, to any person obtaining a copy of this software and associated documentation files (the "Software"), to deal in the Software without restriction, including without limitation the rights to use, copy, modify, merge, publish, distribute, sublicense, and/or sell copies of the Software, and to permit persons to whom the Software is furnished to do so, subject to the following conditions:</a:t>
+              <a:t>Like SQL</a:t>
             </a:r>
           </a:p>
           <a:p>
             <a:r>
               <a:rPr lang="en-US" dirty="0"/>
-              <a:t>The above copyright notice and this permission notice shall be included in all copies or substantial portions of the Software.</a:t>
-            </a:r>
-          </a:p>
-          <a:p>
+              <a:t>Must </a:t>
+            </a:r>
+            <a:r>
+              <a:rPr lang="en-US" dirty="0" err="1"/>
+              <a:t>alsp</a:t>
+            </a:r>
             <a:r>
               <a:rPr lang="en-US" dirty="0"/>
-              <a:t>THE SOFTWARE IS PROVIDED "AS IS", WITHOUT WARRANTY OF ANY KIND, EXPRESS OR IMPLIED, INCLUDING BUT NOT LIMITED TO THE WARRANTIES OF MERCHANTABILITY, FITNESS FOR A PARTICULAR PURPOSE AND NONINFRINGEMENT. IN NO EVENT SHALL THE AUTHORS OR COPYRIGHT HOLDERS BE LIABLE FOR ANY CLAIM, DAMAGES OR OTHER LIABILITY, WHETHER IN AN ACTION OF CONTRACT, TORT OR OTHERWISE, ARISING FROM, OUT OF OR IN CONNECTION WITH THE SOFTWARE OR THE USE OR OTHER DEALINGS IN THE SOFTWARE.</a:t>
-            </a:r>
+              <a:t> use aggregate functions to get meaningful data</a:t>
+            </a:r>
+          </a:p>
+          <a:p>
+            <a:pPr lvl="1"/>
+            <a:r>
+              <a:rPr lang="en-US" dirty="0"/>
+              <a:t>Otherwise just get a </a:t>
+            </a:r>
+            <a:r>
+              <a:rPr lang="en-US" dirty="0" err="1"/>
+              <a:t>groupby</a:t>
+            </a:r>
+            <a:r>
+              <a:rPr lang="en-US" dirty="0"/>
+              <a:t> object</a:t>
+            </a:r>
+          </a:p>
+          <a:p>
+            <a:pPr lvl="1"/>
+            <a:r>
+              <a:rPr lang="en-US" dirty="0"/>
+              <a:t>i.e. </a:t>
+            </a:r>
+            <a:r>
+              <a:rPr lang="en-US" dirty="0" err="1"/>
+              <a:t>dataframe.groupby</a:t>
+            </a:r>
+            <a:r>
+              <a:rPr lang="en-US" dirty="0"/>
+              <a:t>(&lt;column&gt;).count()</a:t>
+            </a:r>
+          </a:p>
+          <a:p>
+            <a:endParaRPr lang="en-US" dirty="0"/>
+          </a:p>
+          <a:p>
+            <a:endParaRPr lang="en-US" dirty="0"/>
           </a:p>
         </p:txBody>
       </p:sp>
     </p:spTree>
     <p:extLst>
       <p:ext uri="{BB962C8B-B14F-4D97-AF65-F5344CB8AC3E}">
-        <p14:creationId xmlns:p14="http://schemas.microsoft.com/office/powerpoint/2010/main" val="3645036191"/>
+        <p14:creationId xmlns:p14="http://schemas.microsoft.com/office/powerpoint/2010/main" val="164047972"/>
+      </p:ext>
+    </p:extLst>
+  </p:cSld>
+  <p:clrMapOvr>
+    <a:masterClrMapping/>
+  </p:clrMapOvr>
+</p:sld>
+</file>
+
+<file path=ppt/slides/slide8.xml><?xml version="1.0" encoding="utf-8"?>
+<p:sld xmlns:a="http://schemas.openxmlformats.org/drawingml/2006/main" xmlns:r="http://schemas.openxmlformats.org/officeDocument/2006/relationships" xmlns:p="http://schemas.openxmlformats.org/presentationml/2006/main">
+  <p:cSld>
+    <p:bg>
+      <p:bgPr>
+        <a:blipFill dpi="0" rotWithShape="1">
+          <a:blip r:embed="rId2">
+            <a:lum/>
+          </a:blip>
+          <a:srcRect/>
+          <a:stretch>
+            <a:fillRect l="-17000" r="-17000"/>
+          </a:stretch>
+        </a:blipFill>
+        <a:effectLst/>
+      </p:bgPr>
+    </p:bg>
+    <p:spTree>
+      <p:nvGrpSpPr>
+        <p:cNvPr id="1" name=""/>
+        <p:cNvGrpSpPr/>
+        <p:nvPr/>
+      </p:nvGrpSpPr>
+      <p:grpSpPr>
+        <a:xfrm>
+          <a:off x="0" y="0"/>
+          <a:ext cx="0" cy="0"/>
+          <a:chOff x="0" y="0"/>
+          <a:chExt cx="0" cy="0"/>
+        </a:xfrm>
+      </p:grpSpPr>
+      <p:sp>
+        <p:nvSpPr>
+          <p:cNvPr id="2" name="Title 1"/>
+          <p:cNvSpPr>
+            <a:spLocks noGrp="1"/>
+          </p:cNvSpPr>
+          <p:nvPr>
+            <p:ph type="title"/>
+          </p:nvPr>
+        </p:nvSpPr>
+        <p:spPr/>
+        <p:txBody>
+          <a:bodyPr/>
+          <a:lstStyle/>
+          <a:p>
+            <a:r>
+              <a:rPr lang="en-US" dirty="0"/>
+              <a:t>Indexing</a:t>
+            </a:r>
+          </a:p>
+        </p:txBody>
+      </p:sp>
+      <p:sp>
+        <p:nvSpPr>
+          <p:cNvPr id="3" name="Content Placeholder 2"/>
+          <p:cNvSpPr>
+            <a:spLocks noGrp="1"/>
+          </p:cNvSpPr>
+          <p:nvPr>
+            <p:ph idx="1"/>
+          </p:nvPr>
+        </p:nvSpPr>
+        <p:spPr/>
+        <p:txBody>
+          <a:bodyPr/>
+          <a:lstStyle/>
+          <a:p>
+            <a:r>
+              <a:rPr lang="en-US" dirty="0"/>
+              <a:t>Unique identifier for each row</a:t>
+            </a:r>
+          </a:p>
+          <a:p>
+            <a:r>
+              <a:rPr lang="en-US" dirty="0"/>
+              <a:t>Can set index to whatever we want with reindex()</a:t>
+            </a:r>
+          </a:p>
+          <a:p>
+            <a:endParaRPr lang="en-US" dirty="0"/>
+          </a:p>
+        </p:txBody>
+      </p:sp>
+    </p:spTree>
+    <p:extLst>
+      <p:ext uri="{BB962C8B-B14F-4D97-AF65-F5344CB8AC3E}">
+        <p14:creationId xmlns:p14="http://schemas.microsoft.com/office/powerpoint/2010/main" val="3772524955"/>
+      </p:ext>
+    </p:extLst>
+  </p:cSld>
+  <p:clrMapOvr>
+    <a:masterClrMapping/>
+  </p:clrMapOvr>
+</p:sld>
+</file>
+
+<file path=ppt/slides/slide9.xml><?xml version="1.0" encoding="utf-8"?>
+<p:sld xmlns:a="http://schemas.openxmlformats.org/drawingml/2006/main" xmlns:r="http://schemas.openxmlformats.org/officeDocument/2006/relationships" xmlns:p="http://schemas.openxmlformats.org/presentationml/2006/main">
+  <p:cSld>
+    <p:bg>
+      <p:bgPr>
+        <a:blipFill dpi="0" rotWithShape="1">
+          <a:blip r:embed="rId2">
+            <a:lum/>
+          </a:blip>
+          <a:srcRect/>
+          <a:stretch>
+            <a:fillRect l="-17000" r="-17000"/>
+          </a:stretch>
+        </a:blipFill>
+        <a:effectLst/>
+      </p:bgPr>
+    </p:bg>
+    <p:spTree>
+      <p:nvGrpSpPr>
+        <p:cNvPr id="1" name=""/>
+        <p:cNvGrpSpPr/>
+        <p:nvPr/>
+      </p:nvGrpSpPr>
+      <p:grpSpPr>
+        <a:xfrm>
+          <a:off x="0" y="0"/>
+          <a:ext cx="0" cy="0"/>
+          <a:chOff x="0" y="0"/>
+          <a:chExt cx="0" cy="0"/>
+        </a:xfrm>
+      </p:grpSpPr>
+      <p:sp>
+        <p:nvSpPr>
+          <p:cNvPr id="2" name="Title 1"/>
+          <p:cNvSpPr>
+            <a:spLocks noGrp="1"/>
+          </p:cNvSpPr>
+          <p:nvPr>
+            <p:ph type="title"/>
+          </p:nvPr>
+        </p:nvSpPr>
+        <p:spPr/>
+        <p:txBody>
+          <a:bodyPr/>
+          <a:lstStyle/>
+          <a:p>
+            <a:r>
+              <a:rPr lang="en-US" dirty="0"/>
+              <a:t>Merging (Joins)</a:t>
+            </a:r>
+          </a:p>
+        </p:txBody>
+      </p:sp>
+      <p:sp>
+        <p:nvSpPr>
+          <p:cNvPr id="3" name="Content Placeholder 2"/>
+          <p:cNvSpPr>
+            <a:spLocks noGrp="1"/>
+          </p:cNvSpPr>
+          <p:nvPr>
+            <p:ph idx="1"/>
+          </p:nvPr>
+        </p:nvSpPr>
+        <p:spPr/>
+        <p:txBody>
+          <a:bodyPr/>
+          <a:lstStyle/>
+          <a:p>
+            <a:r>
+              <a:rPr lang="en-US" dirty="0"/>
+              <a:t>Like SQL joins</a:t>
+            </a:r>
+          </a:p>
+          <a:p>
+            <a:r>
+              <a:rPr lang="en-US" dirty="0"/>
+              <a:t>Specify two </a:t>
+            </a:r>
+            <a:r>
+              <a:rPr lang="en-US" dirty="0" err="1"/>
+              <a:t>DataFrames</a:t>
+            </a:r>
+            <a:r>
+              <a:rPr lang="en-US" dirty="0"/>
+              <a:t> to merge</a:t>
+            </a:r>
+          </a:p>
+          <a:p>
+            <a:r>
+              <a:rPr lang="en-US" dirty="0"/>
+              <a:t>Specify the common parameter</a:t>
+            </a:r>
+          </a:p>
+          <a:p>
+            <a:r>
+              <a:rPr lang="en-US" dirty="0"/>
+              <a:t>Specify the type of join (left, right, </a:t>
+            </a:r>
+            <a:r>
+              <a:rPr lang="en-US" dirty="0" err="1"/>
+              <a:t>etc</a:t>
+            </a:r>
+            <a:r>
+              <a:rPr lang="en-US" dirty="0"/>
+              <a:t>)</a:t>
+            </a:r>
+          </a:p>
+          <a:p>
+            <a:endParaRPr lang="en-US" dirty="0"/>
+          </a:p>
+        </p:txBody>
+      </p:sp>
+    </p:spTree>
+    <p:extLst>
+      <p:ext uri="{BB962C8B-B14F-4D97-AF65-F5344CB8AC3E}">
+        <p14:creationId xmlns:p14="http://schemas.microsoft.com/office/powerpoint/2010/main" val="682222453"/>
       </p:ext>
     </p:extLst>
   </p:cSld>

</xml_diff>

<commit_message>
Added class examples for dataframe merging, concatenating, and some erroneous items.  Added in-class examples for students to try.
</commit_message>
<xml_diff>
--- a/Session 7 - Python/Instructional Material/Session 7 – Python Pandas Data Wrangling.pptx
+++ b/Session 7 - Python/Instructional Material/Session 7 – Python Pandas Data Wrangling.pptx
@@ -12,11 +12,12 @@
     <p:sldId id="376" r:id="rId6"/>
     <p:sldId id="379" r:id="rId7"/>
     <p:sldId id="377" r:id="rId8"/>
-    <p:sldId id="380" r:id="rId9"/>
-    <p:sldId id="381" r:id="rId10"/>
-    <p:sldId id="382" r:id="rId11"/>
-    <p:sldId id="383" r:id="rId12"/>
-    <p:sldId id="375" r:id="rId13"/>
+    <p:sldId id="384" r:id="rId9"/>
+    <p:sldId id="380" r:id="rId10"/>
+    <p:sldId id="381" r:id="rId11"/>
+    <p:sldId id="382" r:id="rId12"/>
+    <p:sldId id="383" r:id="rId13"/>
+    <p:sldId id="375" r:id="rId14"/>
   </p:sldIdLst>
   <p:sldSz cx="9144000" cy="6858000" type="screen4x3"/>
   <p:notesSz cx="6858000" cy="9144000"/>
@@ -6559,6 +6560,131 @@
           <a:p>
             <a:r>
               <a:rPr lang="en-US" dirty="0"/>
+              <a:t>Merging (Joins)</a:t>
+            </a:r>
+          </a:p>
+        </p:txBody>
+      </p:sp>
+      <p:sp>
+        <p:nvSpPr>
+          <p:cNvPr id="3" name="Content Placeholder 2"/>
+          <p:cNvSpPr>
+            <a:spLocks noGrp="1"/>
+          </p:cNvSpPr>
+          <p:nvPr>
+            <p:ph idx="1"/>
+          </p:nvPr>
+        </p:nvSpPr>
+        <p:spPr/>
+        <p:txBody>
+          <a:bodyPr/>
+          <a:lstStyle/>
+          <a:p>
+            <a:r>
+              <a:rPr lang="en-US" dirty="0"/>
+              <a:t>Like SQL joins</a:t>
+            </a:r>
+          </a:p>
+          <a:p>
+            <a:r>
+              <a:rPr lang="en-US" dirty="0"/>
+              <a:t>Specify two </a:t>
+            </a:r>
+            <a:r>
+              <a:rPr lang="en-US" dirty="0" err="1"/>
+              <a:t>DataFrames</a:t>
+            </a:r>
+            <a:r>
+              <a:rPr lang="en-US" dirty="0"/>
+              <a:t> to merge</a:t>
+            </a:r>
+          </a:p>
+          <a:p>
+            <a:r>
+              <a:rPr lang="en-US" dirty="0"/>
+              <a:t>Specify the common parameter</a:t>
+            </a:r>
+          </a:p>
+          <a:p>
+            <a:r>
+              <a:rPr lang="en-US" dirty="0"/>
+              <a:t>Specify the type of join (left, right, </a:t>
+            </a:r>
+            <a:r>
+              <a:rPr lang="en-US" dirty="0" err="1"/>
+              <a:t>etc</a:t>
+            </a:r>
+            <a:r>
+              <a:rPr lang="en-US" dirty="0"/>
+              <a:t>)</a:t>
+            </a:r>
+          </a:p>
+          <a:p>
+            <a:endParaRPr lang="en-US" dirty="0"/>
+          </a:p>
+        </p:txBody>
+      </p:sp>
+    </p:spTree>
+    <p:extLst>
+      <p:ext uri="{BB962C8B-B14F-4D97-AF65-F5344CB8AC3E}">
+        <p14:creationId xmlns:p14="http://schemas.microsoft.com/office/powerpoint/2010/main" val="682222453"/>
+      </p:ext>
+    </p:extLst>
+  </p:cSld>
+  <p:clrMapOvr>
+    <a:masterClrMapping/>
+  </p:clrMapOvr>
+</p:sld>
+</file>
+
+<file path=ppt/slides/slide11.xml><?xml version="1.0" encoding="utf-8"?>
+<p:sld xmlns:a="http://schemas.openxmlformats.org/drawingml/2006/main" xmlns:r="http://schemas.openxmlformats.org/officeDocument/2006/relationships" xmlns:p="http://schemas.openxmlformats.org/presentationml/2006/main">
+  <p:cSld>
+    <p:bg>
+      <p:bgPr>
+        <a:blipFill dpi="0" rotWithShape="1">
+          <a:blip r:embed="rId2">
+            <a:lum/>
+          </a:blip>
+          <a:srcRect/>
+          <a:stretch>
+            <a:fillRect l="-17000" r="-17000"/>
+          </a:stretch>
+        </a:blipFill>
+        <a:effectLst/>
+      </p:bgPr>
+    </p:bg>
+    <p:spTree>
+      <p:nvGrpSpPr>
+        <p:cNvPr id="1" name=""/>
+        <p:cNvGrpSpPr/>
+        <p:nvPr/>
+      </p:nvGrpSpPr>
+      <p:grpSpPr>
+        <a:xfrm>
+          <a:off x="0" y="0"/>
+          <a:ext cx="0" cy="0"/>
+          <a:chOff x="0" y="0"/>
+          <a:chExt cx="0" cy="0"/>
+        </a:xfrm>
+      </p:grpSpPr>
+      <p:sp>
+        <p:nvSpPr>
+          <p:cNvPr id="2" name="Title 1"/>
+          <p:cNvSpPr>
+            <a:spLocks noGrp="1"/>
+          </p:cNvSpPr>
+          <p:nvPr>
+            <p:ph type="title"/>
+          </p:nvPr>
+        </p:nvSpPr>
+        <p:spPr/>
+        <p:txBody>
+          <a:bodyPr/>
+          <a:lstStyle/>
+          <a:p>
+            <a:r>
+              <a:rPr lang="en-US" dirty="0"/>
               <a:t>Concatenation (Unions)</a:t>
             </a:r>
           </a:p>
@@ -6616,7 +6742,7 @@
 </p:sld>
 </file>
 
-<file path=ppt/slides/slide11.xml><?xml version="1.0" encoding="utf-8"?>
+<file path=ppt/slides/slide12.xml><?xml version="1.0" encoding="utf-8"?>
 <p:sld xmlns:a="http://schemas.openxmlformats.org/drawingml/2006/main" xmlns:r="http://schemas.openxmlformats.org/officeDocument/2006/relationships" xmlns:p="http://schemas.openxmlformats.org/presentationml/2006/main">
   <p:cSld>
     <p:bg>
@@ -6789,7 +6915,9 @@
         </p:nvSpPr>
         <p:spPr/>
         <p:txBody>
-          <a:bodyPr/>
+          <a:bodyPr>
+            <a:normAutofit lnSpcReduction="10000"/>
+          </a:bodyPr>
           <a:lstStyle/>
           <a:p>
             <a:r>
@@ -6823,6 +6951,13 @@
             <a:pPr lvl="1"/>
             <a:r>
               <a:rPr lang="en-US" dirty="0"/>
+              <a:t>Filtering</a:t>
+            </a:r>
+          </a:p>
+          <a:p>
+            <a:pPr lvl="1"/>
+            <a:r>
+              <a:rPr lang="en-US" dirty="0"/>
               <a:t>Grouping</a:t>
             </a:r>
           </a:p>
@@ -6837,14 +6972,14 @@
             <a:pPr lvl="1"/>
             <a:r>
               <a:rPr lang="en-US" dirty="0"/>
-              <a:t>Merges</a:t>
+              <a:t>Merges (Join)</a:t>
             </a:r>
           </a:p>
           <a:p>
             <a:pPr lvl="1"/>
             <a:r>
               <a:rPr lang="en-US" dirty="0"/>
-              <a:t>Joins</a:t>
+              <a:t>Concatenation (Union)</a:t>
             </a:r>
           </a:p>
           <a:p>
@@ -7409,7 +7544,7 @@
           <a:p>
             <a:r>
               <a:rPr lang="en-US" dirty="0"/>
-              <a:t>Grouping</a:t>
+              <a:t>Filtering</a:t>
             </a:r>
           </a:p>
         </p:txBody>
@@ -7428,66 +7563,6 @@
         <p:txBody>
           <a:bodyPr/>
           <a:lstStyle/>
-          <a:p>
-            <a:r>
-              <a:rPr lang="en-US" dirty="0"/>
-              <a:t>Group data with a common identifier together</a:t>
-            </a:r>
-          </a:p>
-          <a:p>
-            <a:pPr lvl="1"/>
-            <a:r>
-              <a:rPr lang="en-US" dirty="0"/>
-              <a:t>Like SQL</a:t>
-            </a:r>
-          </a:p>
-          <a:p>
-            <a:r>
-              <a:rPr lang="en-US" dirty="0"/>
-              <a:t>Must </a:t>
-            </a:r>
-            <a:r>
-              <a:rPr lang="en-US" dirty="0" err="1"/>
-              <a:t>alsp</a:t>
-            </a:r>
-            <a:r>
-              <a:rPr lang="en-US" dirty="0"/>
-              <a:t> use aggregate functions to get meaningful data</a:t>
-            </a:r>
-          </a:p>
-          <a:p>
-            <a:pPr lvl="1"/>
-            <a:r>
-              <a:rPr lang="en-US" dirty="0"/>
-              <a:t>Otherwise just get a </a:t>
-            </a:r>
-            <a:r>
-              <a:rPr lang="en-US" dirty="0" err="1"/>
-              <a:t>groupby</a:t>
-            </a:r>
-            <a:r>
-              <a:rPr lang="en-US" dirty="0"/>
-              <a:t> object</a:t>
-            </a:r>
-          </a:p>
-          <a:p>
-            <a:pPr lvl="1"/>
-            <a:r>
-              <a:rPr lang="en-US" dirty="0"/>
-              <a:t>i.e. </a:t>
-            </a:r>
-            <a:r>
-              <a:rPr lang="en-US" dirty="0" err="1"/>
-              <a:t>dataframe.groupby</a:t>
-            </a:r>
-            <a:r>
-              <a:rPr lang="en-US" dirty="0"/>
-              <a:t>(&lt;column&gt;).count()</a:t>
-            </a:r>
-          </a:p>
-          <a:p>
-            <a:endParaRPr lang="en-US" dirty="0"/>
-          </a:p>
           <a:p>
             <a:endParaRPr lang="en-US" dirty="0"/>
           </a:p>
@@ -7496,7 +7571,7 @@
     </p:spTree>
     <p:extLst>
       <p:ext uri="{BB962C8B-B14F-4D97-AF65-F5344CB8AC3E}">
-        <p14:creationId xmlns:p14="http://schemas.microsoft.com/office/powerpoint/2010/main" val="164047972"/>
+        <p14:creationId xmlns:p14="http://schemas.microsoft.com/office/powerpoint/2010/main" val="2531241582"/>
       </p:ext>
     </p:extLst>
   </p:cSld>
@@ -7554,7 +7629,7 @@
           <a:p>
             <a:r>
               <a:rPr lang="en-US" dirty="0"/>
-              <a:t>Indexing</a:t>
+              <a:t>Grouping</a:t>
             </a:r>
           </a:p>
         </p:txBody>
@@ -7576,14 +7651,62 @@
           <a:p>
             <a:r>
               <a:rPr lang="en-US" dirty="0"/>
-              <a:t>Unique identifier for each row</a:t>
-            </a:r>
-          </a:p>
-          <a:p>
+              <a:t>Group data with a common identifier together</a:t>
+            </a:r>
+          </a:p>
+          <a:p>
+            <a:pPr lvl="1"/>
             <a:r>
               <a:rPr lang="en-US" dirty="0"/>
-              <a:t>Can set index to whatever we want with reindex()</a:t>
-            </a:r>
+              <a:t>Like SQL</a:t>
+            </a:r>
+          </a:p>
+          <a:p>
+            <a:r>
+              <a:rPr lang="en-US" dirty="0"/>
+              <a:t>Must </a:t>
+            </a:r>
+            <a:r>
+              <a:rPr lang="en-US" dirty="0" err="1"/>
+              <a:t>alsp</a:t>
+            </a:r>
+            <a:r>
+              <a:rPr lang="en-US" dirty="0"/>
+              <a:t> use aggregate functions to get meaningful data</a:t>
+            </a:r>
+          </a:p>
+          <a:p>
+            <a:pPr lvl="1"/>
+            <a:r>
+              <a:rPr lang="en-US" dirty="0"/>
+              <a:t>Otherwise just get a </a:t>
+            </a:r>
+            <a:r>
+              <a:rPr lang="en-US" dirty="0" err="1"/>
+              <a:t>groupby</a:t>
+            </a:r>
+            <a:r>
+              <a:rPr lang="en-US" dirty="0"/>
+              <a:t> object</a:t>
+            </a:r>
+          </a:p>
+          <a:p>
+            <a:pPr lvl="1"/>
+            <a:r>
+              <a:rPr lang="en-US" dirty="0"/>
+              <a:t>i.e. </a:t>
+            </a:r>
+            <a:r>
+              <a:rPr lang="en-US" dirty="0" err="1"/>
+              <a:t>dataframe.groupby</a:t>
+            </a:r>
+            <a:r>
+              <a:rPr lang="en-US" dirty="0"/>
+              <a:t>(&lt;column&gt;).count()</a:t>
+            </a:r>
+          </a:p>
+          <a:p>
+            <a:endParaRPr lang="en-US" dirty="0"/>
           </a:p>
           <a:p>
             <a:endParaRPr lang="en-US" dirty="0"/>
@@ -7593,7 +7716,7 @@
     </p:spTree>
     <p:extLst>
       <p:ext uri="{BB962C8B-B14F-4D97-AF65-F5344CB8AC3E}">
-        <p14:creationId xmlns:p14="http://schemas.microsoft.com/office/powerpoint/2010/main" val="3772524955"/>
+        <p14:creationId xmlns:p14="http://schemas.microsoft.com/office/powerpoint/2010/main" val="164047972"/>
       </p:ext>
     </p:extLst>
   </p:cSld>
@@ -7651,7 +7774,7 @@
           <a:p>
             <a:r>
               <a:rPr lang="en-US" dirty="0"/>
-              <a:t>Merging (Joins)</a:t>
+              <a:t>Indexing</a:t>
             </a:r>
           </a:p>
         </p:txBody>
@@ -7673,41 +7796,13 @@
           <a:p>
             <a:r>
               <a:rPr lang="en-US" dirty="0"/>
-              <a:t>Like SQL joins</a:t>
+              <a:t>Unique identifier for each row</a:t>
             </a:r>
           </a:p>
           <a:p>
             <a:r>
               <a:rPr lang="en-US" dirty="0"/>
-              <a:t>Specify two </a:t>
-            </a:r>
-            <a:r>
-              <a:rPr lang="en-US" dirty="0" err="1"/>
-              <a:t>DataFrames</a:t>
-            </a:r>
-            <a:r>
-              <a:rPr lang="en-US" dirty="0"/>
-              <a:t> to merge</a:t>
-            </a:r>
-          </a:p>
-          <a:p>
-            <a:r>
-              <a:rPr lang="en-US" dirty="0"/>
-              <a:t>Specify the common parameter</a:t>
-            </a:r>
-          </a:p>
-          <a:p>
-            <a:r>
-              <a:rPr lang="en-US" dirty="0"/>
-              <a:t>Specify the type of join (left, right, </a:t>
-            </a:r>
-            <a:r>
-              <a:rPr lang="en-US" dirty="0" err="1"/>
-              <a:t>etc</a:t>
-            </a:r>
-            <a:r>
-              <a:rPr lang="en-US" dirty="0"/>
-              <a:t>)</a:t>
+              <a:t>Can set index to whatever we want with reindex()</a:t>
             </a:r>
           </a:p>
           <a:p>
@@ -7718,7 +7813,7 @@
     </p:spTree>
     <p:extLst>
       <p:ext uri="{BB962C8B-B14F-4D97-AF65-F5344CB8AC3E}">
-        <p14:creationId xmlns:p14="http://schemas.microsoft.com/office/powerpoint/2010/main" val="682222453"/>
+        <p14:creationId xmlns:p14="http://schemas.microsoft.com/office/powerpoint/2010/main" val="3772524955"/>
       </p:ext>
     </p:extLst>
   </p:cSld>

</xml_diff>

<commit_message>
Added images for dataframe operations.
</commit_message>
<xml_diff>
--- a/Session 7 - Python/Instructional Material/Session 7 – Python Pandas Data Wrangling.pptx
+++ b/Session 7 - Python/Instructional Material/Session 7 – Python Pandas Data Wrangling.pptx
@@ -9,15 +9,17 @@
     <p:sldId id="256" r:id="rId3"/>
     <p:sldId id="280" r:id="rId4"/>
     <p:sldId id="378" r:id="rId5"/>
-    <p:sldId id="376" r:id="rId6"/>
-    <p:sldId id="379" r:id="rId7"/>
-    <p:sldId id="377" r:id="rId8"/>
-    <p:sldId id="384" r:id="rId9"/>
-    <p:sldId id="380" r:id="rId10"/>
-    <p:sldId id="381" r:id="rId11"/>
-    <p:sldId id="382" r:id="rId12"/>
-    <p:sldId id="383" r:id="rId13"/>
-    <p:sldId id="375" r:id="rId14"/>
+    <p:sldId id="385" r:id="rId6"/>
+    <p:sldId id="376" r:id="rId7"/>
+    <p:sldId id="379" r:id="rId8"/>
+    <p:sldId id="377" r:id="rId9"/>
+    <p:sldId id="384" r:id="rId10"/>
+    <p:sldId id="380" r:id="rId11"/>
+    <p:sldId id="386" r:id="rId12"/>
+    <p:sldId id="381" r:id="rId13"/>
+    <p:sldId id="382" r:id="rId14"/>
+    <p:sldId id="383" r:id="rId15"/>
+    <p:sldId id="375" r:id="rId16"/>
   </p:sldIdLst>
   <p:sldSz cx="9144000" cy="6858000" type="screen4x3"/>
   <p:notesSz cx="6858000" cy="9144000"/>
@@ -314,7 +316,7 @@
           <a:p>
             <a:fld id="{547641E8-73DF-4AD2-848E-3103064331B1}" type="datetimeFigureOut">
               <a:rPr lang="en-US" smtClean="0"/>
-              <a:t>9/22/2021</a:t>
+              <a:t>11/26/2021</a:t>
             </a:fld>
             <a:endParaRPr lang="en-US"/>
           </a:p>
@@ -482,7 +484,7 @@
           <a:p>
             <a:fld id="{547641E8-73DF-4AD2-848E-3103064331B1}" type="datetimeFigureOut">
               <a:rPr lang="en-US" smtClean="0"/>
-              <a:t>9/22/2021</a:t>
+              <a:t>11/26/2021</a:t>
             </a:fld>
             <a:endParaRPr lang="en-US"/>
           </a:p>
@@ -660,7 +662,7 @@
           <a:p>
             <a:fld id="{547641E8-73DF-4AD2-848E-3103064331B1}" type="datetimeFigureOut">
               <a:rPr lang="en-US" smtClean="0"/>
-              <a:t>9/22/2021</a:t>
+              <a:t>11/26/2021</a:t>
             </a:fld>
             <a:endParaRPr lang="en-US"/>
           </a:p>
@@ -907,7 +909,7 @@
                 </a:solidFill>
               </a:rPr>
               <a:pPr/>
-              <a:t>9/22/2021</a:t>
+              <a:t>11/26/2021</a:t>
             </a:fld>
             <a:endParaRPr lang="en-US">
               <a:solidFill>
@@ -1107,7 +1109,7 @@
                 </a:solidFill>
               </a:rPr>
               <a:pPr/>
-              <a:t>9/22/2021</a:t>
+              <a:t>11/26/2021</a:t>
             </a:fld>
             <a:endParaRPr lang="en-US">
               <a:solidFill>
@@ -1384,7 +1386,7 @@
                 </a:solidFill>
               </a:rPr>
               <a:pPr/>
-              <a:t>9/22/2021</a:t>
+              <a:t>11/26/2021</a:t>
             </a:fld>
             <a:endParaRPr lang="en-US">
               <a:solidFill>
@@ -1701,7 +1703,7 @@
                 </a:solidFill>
               </a:rPr>
               <a:pPr/>
-              <a:t>9/22/2021</a:t>
+              <a:t>11/26/2021</a:t>
             </a:fld>
             <a:endParaRPr lang="en-US">
               <a:solidFill>
@@ -2152,7 +2154,7 @@
                 </a:solidFill>
               </a:rPr>
               <a:pPr/>
-              <a:t>9/22/2021</a:t>
+              <a:t>11/26/2021</a:t>
             </a:fld>
             <a:endParaRPr lang="en-US">
               <a:solidFill>
@@ -2301,7 +2303,7 @@
                 </a:solidFill>
               </a:rPr>
               <a:pPr/>
-              <a:t>9/22/2021</a:t>
+              <a:t>11/26/2021</a:t>
             </a:fld>
             <a:endParaRPr lang="en-US">
               <a:solidFill>
@@ -2428,7 +2430,7 @@
                 </a:solidFill>
               </a:rPr>
               <a:pPr/>
-              <a:t>9/22/2021</a:t>
+              <a:t>11/26/2021</a:t>
             </a:fld>
             <a:endParaRPr lang="en-US">
               <a:solidFill>
@@ -2735,7 +2737,7 @@
                 </a:solidFill>
               </a:rPr>
               <a:pPr/>
-              <a:t>9/22/2021</a:t>
+              <a:t>11/26/2021</a:t>
             </a:fld>
             <a:endParaRPr lang="en-US">
               <a:solidFill>
@@ -2928,7 +2930,7 @@
           <a:p>
             <a:fld id="{547641E8-73DF-4AD2-848E-3103064331B1}" type="datetimeFigureOut">
               <a:rPr lang="en-US" smtClean="0"/>
-              <a:t>9/22/2021</a:t>
+              <a:t>11/26/2021</a:t>
             </a:fld>
             <a:endParaRPr lang="en-US"/>
           </a:p>
@@ -3187,7 +3189,7 @@
                 </a:solidFill>
               </a:rPr>
               <a:pPr/>
-              <a:t>9/22/2021</a:t>
+              <a:t>11/26/2021</a:t>
             </a:fld>
             <a:endParaRPr lang="en-US">
               <a:solidFill>
@@ -3387,7 +3389,7 @@
                 </a:solidFill>
               </a:rPr>
               <a:pPr/>
-              <a:t>9/22/2021</a:t>
+              <a:t>11/26/2021</a:t>
             </a:fld>
             <a:endParaRPr lang="en-US">
               <a:solidFill>
@@ -3597,7 +3599,7 @@
                 </a:solidFill>
               </a:rPr>
               <a:pPr/>
-              <a:t>9/22/2021</a:t>
+              <a:t>11/26/2021</a:t>
             </a:fld>
             <a:endParaRPr lang="en-US">
               <a:solidFill>
@@ -3867,7 +3869,7 @@
           <a:p>
             <a:fld id="{547641E8-73DF-4AD2-848E-3103064331B1}" type="datetimeFigureOut">
               <a:rPr lang="en-US" smtClean="0"/>
-              <a:t>9/22/2021</a:t>
+              <a:t>11/26/2021</a:t>
             </a:fld>
             <a:endParaRPr lang="en-US"/>
           </a:p>
@@ -4152,7 +4154,7 @@
           <a:p>
             <a:fld id="{547641E8-73DF-4AD2-848E-3103064331B1}" type="datetimeFigureOut">
               <a:rPr lang="en-US" smtClean="0"/>
-              <a:t>9/22/2021</a:t>
+              <a:t>11/26/2021</a:t>
             </a:fld>
             <a:endParaRPr lang="en-US"/>
           </a:p>
@@ -4571,7 +4573,7 @@
           <a:p>
             <a:fld id="{547641E8-73DF-4AD2-848E-3103064331B1}" type="datetimeFigureOut">
               <a:rPr lang="en-US" smtClean="0"/>
-              <a:t>9/22/2021</a:t>
+              <a:t>11/26/2021</a:t>
             </a:fld>
             <a:endParaRPr lang="en-US"/>
           </a:p>
@@ -4688,7 +4690,7 @@
           <a:p>
             <a:fld id="{547641E8-73DF-4AD2-848E-3103064331B1}" type="datetimeFigureOut">
               <a:rPr lang="en-US" smtClean="0"/>
-              <a:t>9/22/2021</a:t>
+              <a:t>11/26/2021</a:t>
             </a:fld>
             <a:endParaRPr lang="en-US"/>
           </a:p>
@@ -4783,7 +4785,7 @@
           <a:p>
             <a:fld id="{547641E8-73DF-4AD2-848E-3103064331B1}" type="datetimeFigureOut">
               <a:rPr lang="en-US" smtClean="0"/>
-              <a:t>9/22/2021</a:t>
+              <a:t>11/26/2021</a:t>
             </a:fld>
             <a:endParaRPr lang="en-US"/>
           </a:p>
@@ -5058,7 +5060,7 @@
           <a:p>
             <a:fld id="{547641E8-73DF-4AD2-848E-3103064331B1}" type="datetimeFigureOut">
               <a:rPr lang="en-US" smtClean="0"/>
-              <a:t>9/22/2021</a:t>
+              <a:t>11/26/2021</a:t>
             </a:fld>
             <a:endParaRPr lang="en-US"/>
           </a:p>
@@ -5310,7 +5312,7 @@
           <a:p>
             <a:fld id="{547641E8-73DF-4AD2-848E-3103064331B1}" type="datetimeFigureOut">
               <a:rPr lang="en-US" smtClean="0"/>
-              <a:t>9/22/2021</a:t>
+              <a:t>11/26/2021</a:t>
             </a:fld>
             <a:endParaRPr lang="en-US"/>
           </a:p>
@@ -5524,7 +5526,7 @@
           <a:p>
             <a:fld id="{547641E8-73DF-4AD2-848E-3103064331B1}" type="datetimeFigureOut">
               <a:rPr lang="en-US" smtClean="0"/>
-              <a:t>9/22/2021</a:t>
+              <a:t>11/26/2021</a:t>
             </a:fld>
             <a:endParaRPr lang="en-US"/>
           </a:p>
@@ -6039,7 +6041,7 @@
                 </a:solidFill>
               </a:rPr>
               <a:pPr/>
-              <a:t>9/22/2021</a:t>
+              <a:t>11/26/2021</a:t>
             </a:fld>
             <a:endParaRPr lang="en-US">
               <a:solidFill>
@@ -6560,7 +6562,7 @@
           <a:p>
             <a:r>
               <a:rPr lang="en-US" dirty="0"/>
-              <a:t>Merging (Joins)</a:t>
+              <a:t>Grouping</a:t>
             </a:r>
           </a:p>
         </p:txBody>
@@ -6582,42 +6584,54 @@
           <a:p>
             <a:r>
               <a:rPr lang="en-US" dirty="0"/>
-              <a:t>Like SQL joins</a:t>
-            </a:r>
-          </a:p>
-          <a:p>
+              <a:t>Group data with a common identifier together</a:t>
+            </a:r>
+          </a:p>
+          <a:p>
+            <a:pPr lvl="1"/>
             <a:r>
               <a:rPr lang="en-US" dirty="0"/>
-              <a:t>Specify two </a:t>
+              <a:t>Like SQL</a:t>
+            </a:r>
+          </a:p>
+          <a:p>
+            <a:r>
+              <a:rPr lang="en-US" dirty="0"/>
+              <a:t>Must also use aggregate functions to get meaningful data</a:t>
+            </a:r>
+          </a:p>
+          <a:p>
+            <a:pPr lvl="1"/>
+            <a:r>
+              <a:rPr lang="en-US" dirty="0"/>
+              <a:t>Otherwise just get a </a:t>
             </a:r>
             <a:r>
               <a:rPr lang="en-US" dirty="0" err="1"/>
-              <a:t>DataFrames</a:t>
+              <a:t>groupby</a:t>
             </a:r>
             <a:r>
               <a:rPr lang="en-US" dirty="0"/>
-              <a:t> to merge</a:t>
-            </a:r>
-          </a:p>
-          <a:p>
+              <a:t> object</a:t>
+            </a:r>
+          </a:p>
+          <a:p>
+            <a:pPr lvl="1"/>
             <a:r>
               <a:rPr lang="en-US" dirty="0"/>
-              <a:t>Specify the common parameter</a:t>
-            </a:r>
-          </a:p>
-          <a:p>
+              <a:t>i.e. </a:t>
+            </a:r>
+            <a:r>
+              <a:rPr lang="en-US" dirty="0" err="1"/>
+              <a:t>dataframe.groupby</a:t>
+            </a:r>
             <a:r>
               <a:rPr lang="en-US" dirty="0"/>
-              <a:t>Specify the type of join (left, right, </a:t>
-            </a:r>
-            <a:r>
-              <a:rPr lang="en-US" dirty="0" err="1"/>
-              <a:t>etc</a:t>
-            </a:r>
-            <a:r>
-              <a:rPr lang="en-US" dirty="0"/>
-              <a:t>)</a:t>
-            </a:r>
+              <a:t>(&lt;column&gt;).count()</a:t>
+            </a:r>
+          </a:p>
+          <a:p>
+            <a:endParaRPr lang="en-US" dirty="0"/>
           </a:p>
           <a:p>
             <a:endParaRPr lang="en-US" dirty="0"/>
@@ -6627,7 +6641,7 @@
     </p:spTree>
     <p:extLst>
       <p:ext uri="{BB962C8B-B14F-4D97-AF65-F5344CB8AC3E}">
-        <p14:creationId xmlns:p14="http://schemas.microsoft.com/office/powerpoint/2010/main" val="682222453"/>
+        <p14:creationId xmlns:p14="http://schemas.microsoft.com/office/powerpoint/2010/main" val="3753481620"/>
       </p:ext>
     </p:extLst>
   </p:cSld>
@@ -6685,6 +6699,658 @@
           <a:p>
             <a:r>
               <a:rPr lang="en-US" dirty="0"/>
+              <a:t>Indexing</a:t>
+            </a:r>
+          </a:p>
+        </p:txBody>
+      </p:sp>
+      <p:sp>
+        <p:nvSpPr>
+          <p:cNvPr id="3" name="Content Placeholder 2"/>
+          <p:cNvSpPr>
+            <a:spLocks noGrp="1"/>
+          </p:cNvSpPr>
+          <p:nvPr>
+            <p:ph idx="1"/>
+          </p:nvPr>
+        </p:nvSpPr>
+        <p:spPr/>
+        <p:txBody>
+          <a:bodyPr/>
+          <a:lstStyle/>
+          <a:p>
+            <a:r>
+              <a:rPr lang="en-US" dirty="0"/>
+              <a:t>Unique identifier for each row</a:t>
+            </a:r>
+          </a:p>
+          <a:p>
+            <a:r>
+              <a:rPr lang="en-US" dirty="0"/>
+              <a:t>Can set index to whatever column we want with &lt;df&gt;.</a:t>
+            </a:r>
+            <a:r>
+              <a:rPr lang="en-US" dirty="0" err="1"/>
+              <a:t>set_index</a:t>
+            </a:r>
+            <a:r>
+              <a:rPr lang="en-US" dirty="0"/>
+              <a:t>()</a:t>
+            </a:r>
+          </a:p>
+          <a:p>
+            <a:r>
+              <a:rPr lang="en-US" dirty="0"/>
+              <a:t>Can reset index to whatever column we want with reindex()</a:t>
+            </a:r>
+          </a:p>
+          <a:p>
+            <a:endParaRPr lang="en-US" dirty="0"/>
+          </a:p>
+        </p:txBody>
+      </p:sp>
+    </p:spTree>
+    <p:extLst>
+      <p:ext uri="{BB962C8B-B14F-4D97-AF65-F5344CB8AC3E}">
+        <p14:creationId xmlns:p14="http://schemas.microsoft.com/office/powerpoint/2010/main" val="3772524955"/>
+      </p:ext>
+    </p:extLst>
+  </p:cSld>
+  <p:clrMapOvr>
+    <a:masterClrMapping/>
+  </p:clrMapOvr>
+</p:sld>
+</file>
+
+<file path=ppt/slides/slide12.xml><?xml version="1.0" encoding="utf-8"?>
+<p:sld xmlns:a="http://schemas.openxmlformats.org/drawingml/2006/main" xmlns:r="http://schemas.openxmlformats.org/officeDocument/2006/relationships" xmlns:p="http://schemas.openxmlformats.org/presentationml/2006/main">
+  <p:cSld>
+    <p:bg>
+      <p:bgPr>
+        <a:blipFill dpi="0" rotWithShape="1">
+          <a:blip r:embed="rId2">
+            <a:lum/>
+          </a:blip>
+          <a:srcRect/>
+          <a:stretch>
+            <a:fillRect l="-17000" r="-17000"/>
+          </a:stretch>
+        </a:blipFill>
+        <a:effectLst/>
+      </p:bgPr>
+    </p:bg>
+    <p:spTree>
+      <p:nvGrpSpPr>
+        <p:cNvPr id="1" name=""/>
+        <p:cNvGrpSpPr/>
+        <p:nvPr/>
+      </p:nvGrpSpPr>
+      <p:grpSpPr>
+        <a:xfrm>
+          <a:off x="0" y="0"/>
+          <a:ext cx="0" cy="0"/>
+          <a:chOff x="0" y="0"/>
+          <a:chExt cx="0" cy="0"/>
+        </a:xfrm>
+      </p:grpSpPr>
+      <p:sp>
+        <p:nvSpPr>
+          <p:cNvPr id="2" name="Title 1"/>
+          <p:cNvSpPr>
+            <a:spLocks noGrp="1"/>
+          </p:cNvSpPr>
+          <p:nvPr>
+            <p:ph type="title"/>
+          </p:nvPr>
+        </p:nvSpPr>
+        <p:spPr/>
+        <p:txBody>
+          <a:bodyPr/>
+          <a:lstStyle/>
+          <a:p>
+            <a:r>
+              <a:rPr lang="en-US" dirty="0"/>
+              <a:t>Merging (Joins)</a:t>
+            </a:r>
+          </a:p>
+        </p:txBody>
+      </p:sp>
+      <p:sp>
+        <p:nvSpPr>
+          <p:cNvPr id="3" name="Content Placeholder 2"/>
+          <p:cNvSpPr>
+            <a:spLocks noGrp="1"/>
+          </p:cNvSpPr>
+          <p:nvPr>
+            <p:ph idx="1"/>
+          </p:nvPr>
+        </p:nvSpPr>
+        <p:spPr/>
+        <p:txBody>
+          <a:bodyPr/>
+          <a:lstStyle/>
+          <a:p>
+            <a:r>
+              <a:rPr lang="en-US" dirty="0"/>
+              <a:t>Like SQL joins</a:t>
+            </a:r>
+          </a:p>
+          <a:p>
+            <a:r>
+              <a:rPr lang="en-US" dirty="0"/>
+              <a:t>Specify two </a:t>
+            </a:r>
+            <a:r>
+              <a:rPr lang="en-US" dirty="0" err="1"/>
+              <a:t>DataFrames</a:t>
+            </a:r>
+            <a:r>
+              <a:rPr lang="en-US" dirty="0"/>
+              <a:t> to merge</a:t>
+            </a:r>
+          </a:p>
+          <a:p>
+            <a:r>
+              <a:rPr lang="en-US" dirty="0"/>
+              <a:t>Specify the common parameter</a:t>
+            </a:r>
+          </a:p>
+          <a:p>
+            <a:r>
+              <a:rPr lang="en-US" dirty="0"/>
+              <a:t>Specify the type of join (left, right, </a:t>
+            </a:r>
+            <a:r>
+              <a:rPr lang="en-US" dirty="0" err="1"/>
+              <a:t>etc</a:t>
+            </a:r>
+            <a:r>
+              <a:rPr lang="en-US" dirty="0"/>
+              <a:t>)</a:t>
+            </a:r>
+          </a:p>
+          <a:p>
+            <a:endParaRPr lang="en-US" dirty="0"/>
+          </a:p>
+        </p:txBody>
+      </p:sp>
+      <p:sp>
+        <p:nvSpPr>
+          <p:cNvPr id="4" name="TextBox 3">
+            <a:extLst>
+              <a:ext uri="{FF2B5EF4-FFF2-40B4-BE49-F238E27FC236}">
+                <a16:creationId xmlns:a16="http://schemas.microsoft.com/office/drawing/2014/main" id="{4C486F52-A430-417D-AA45-9525470C2D85}"/>
+              </a:ext>
+            </a:extLst>
+          </p:cNvPr>
+          <p:cNvSpPr txBox="1"/>
+          <p:nvPr/>
+        </p:nvSpPr>
+        <p:spPr>
+          <a:xfrm>
+            <a:off x="228600" y="5029200"/>
+            <a:ext cx="1524000" cy="923330"/>
+          </a:xfrm>
+          <a:prstGeom prst="rect">
+            <a:avLst/>
+          </a:prstGeom>
+          <a:solidFill>
+            <a:schemeClr val="accent4">
+              <a:lumMod val="75000"/>
+            </a:schemeClr>
+          </a:solidFill>
+        </p:spPr>
+        <p:txBody>
+          <a:bodyPr wrap="square" rtlCol="0">
+            <a:spAutoFit/>
+          </a:bodyPr>
+          <a:lstStyle/>
+          <a:p>
+            <a:pPr algn="ctr"/>
+            <a:endParaRPr lang="en-US" b="1" dirty="0">
+              <a:solidFill>
+                <a:schemeClr val="bg1">
+                  <a:lumMod val="10000"/>
+                </a:schemeClr>
+              </a:solidFill>
+            </a:endParaRPr>
+          </a:p>
+          <a:p>
+            <a:pPr algn="ctr"/>
+            <a:r>
+              <a:rPr lang="en-US" b="1" dirty="0" err="1">
+                <a:solidFill>
+                  <a:schemeClr val="bg1">
+                    <a:lumMod val="10000"/>
+                  </a:schemeClr>
+                </a:solidFill>
+              </a:rPr>
+              <a:t>DataFrame</a:t>
+            </a:r>
+            <a:r>
+              <a:rPr lang="en-US" b="1" dirty="0">
+                <a:solidFill>
+                  <a:schemeClr val="bg1">
+                    <a:lumMod val="10000"/>
+                  </a:schemeClr>
+                </a:solidFill>
+              </a:rPr>
+              <a:t> 1</a:t>
+            </a:r>
+          </a:p>
+          <a:p>
+            <a:pPr algn="ctr"/>
+            <a:endParaRPr lang="en-US" b="1" dirty="0">
+              <a:solidFill>
+                <a:schemeClr val="bg1">
+                  <a:lumMod val="10000"/>
+                </a:schemeClr>
+              </a:solidFill>
+            </a:endParaRPr>
+          </a:p>
+        </p:txBody>
+      </p:sp>
+      <p:sp>
+        <p:nvSpPr>
+          <p:cNvPr id="5" name="TextBox 4">
+            <a:extLst>
+              <a:ext uri="{FF2B5EF4-FFF2-40B4-BE49-F238E27FC236}">
+                <a16:creationId xmlns:a16="http://schemas.microsoft.com/office/drawing/2014/main" id="{F43FFE83-21AB-427C-B5E9-06AB4B94EE84}"/>
+              </a:ext>
+            </a:extLst>
+          </p:cNvPr>
+          <p:cNvSpPr txBox="1"/>
+          <p:nvPr/>
+        </p:nvSpPr>
+        <p:spPr>
+          <a:xfrm>
+            <a:off x="3048000" y="5029200"/>
+            <a:ext cx="1524000" cy="923330"/>
+          </a:xfrm>
+          <a:prstGeom prst="rect">
+            <a:avLst/>
+          </a:prstGeom>
+          <a:solidFill>
+            <a:schemeClr val="accent4">
+              <a:lumMod val="75000"/>
+            </a:schemeClr>
+          </a:solidFill>
+        </p:spPr>
+        <p:txBody>
+          <a:bodyPr wrap="square" rtlCol="0">
+            <a:spAutoFit/>
+          </a:bodyPr>
+          <a:lstStyle/>
+          <a:p>
+            <a:pPr algn="ctr"/>
+            <a:endParaRPr lang="en-US" b="1" dirty="0">
+              <a:solidFill>
+                <a:schemeClr val="bg1">
+                  <a:lumMod val="10000"/>
+                </a:schemeClr>
+              </a:solidFill>
+            </a:endParaRPr>
+          </a:p>
+          <a:p>
+            <a:pPr algn="ctr"/>
+            <a:r>
+              <a:rPr lang="en-US" b="1" dirty="0" err="1">
+                <a:solidFill>
+                  <a:schemeClr val="bg1">
+                    <a:lumMod val="10000"/>
+                  </a:schemeClr>
+                </a:solidFill>
+              </a:rPr>
+              <a:t>DataFrame</a:t>
+            </a:r>
+            <a:r>
+              <a:rPr lang="en-US" b="1" dirty="0">
+                <a:solidFill>
+                  <a:schemeClr val="bg1">
+                    <a:lumMod val="10000"/>
+                  </a:schemeClr>
+                </a:solidFill>
+              </a:rPr>
+              <a:t> 2</a:t>
+            </a:r>
+          </a:p>
+          <a:p>
+            <a:pPr algn="ctr"/>
+            <a:endParaRPr lang="en-US" b="1" dirty="0">
+              <a:solidFill>
+                <a:schemeClr val="bg1">
+                  <a:lumMod val="10000"/>
+                </a:schemeClr>
+              </a:solidFill>
+            </a:endParaRPr>
+          </a:p>
+        </p:txBody>
+      </p:sp>
+      <p:sp>
+        <p:nvSpPr>
+          <p:cNvPr id="6" name="TextBox 5">
+            <a:extLst>
+              <a:ext uri="{FF2B5EF4-FFF2-40B4-BE49-F238E27FC236}">
+                <a16:creationId xmlns:a16="http://schemas.microsoft.com/office/drawing/2014/main" id="{BD846338-8F08-4997-A7B8-2738F834CA8D}"/>
+              </a:ext>
+            </a:extLst>
+          </p:cNvPr>
+          <p:cNvSpPr txBox="1"/>
+          <p:nvPr/>
+        </p:nvSpPr>
+        <p:spPr>
+          <a:xfrm>
+            <a:off x="5905500" y="5029200"/>
+            <a:ext cx="2857500" cy="923330"/>
+          </a:xfrm>
+          <a:prstGeom prst="rect">
+            <a:avLst/>
+          </a:prstGeom>
+          <a:solidFill>
+            <a:schemeClr val="accent4">
+              <a:lumMod val="75000"/>
+            </a:schemeClr>
+          </a:solidFill>
+        </p:spPr>
+        <p:txBody>
+          <a:bodyPr wrap="square" rtlCol="0">
+            <a:spAutoFit/>
+          </a:bodyPr>
+          <a:lstStyle/>
+          <a:p>
+            <a:pPr algn="ctr"/>
+            <a:endParaRPr lang="en-US" b="1" dirty="0">
+              <a:solidFill>
+                <a:schemeClr val="bg1">
+                  <a:lumMod val="10000"/>
+                </a:schemeClr>
+              </a:solidFill>
+            </a:endParaRPr>
+          </a:p>
+          <a:p>
+            <a:pPr algn="ctr"/>
+            <a:r>
+              <a:rPr lang="en-US" b="1" dirty="0" err="1">
+                <a:solidFill>
+                  <a:schemeClr val="bg1">
+                    <a:lumMod val="10000"/>
+                  </a:schemeClr>
+                </a:solidFill>
+              </a:rPr>
+              <a:t>DataFrame</a:t>
+            </a:r>
+            <a:r>
+              <a:rPr lang="en-US" b="1" dirty="0">
+                <a:solidFill>
+                  <a:schemeClr val="bg1">
+                    <a:lumMod val="10000"/>
+                  </a:schemeClr>
+                </a:solidFill>
+              </a:rPr>
+              <a:t> 1  </a:t>
+            </a:r>
+            <a:r>
+              <a:rPr lang="en-US" b="1" dirty="0" err="1">
+                <a:solidFill>
+                  <a:schemeClr val="bg1">
+                    <a:lumMod val="10000"/>
+                  </a:schemeClr>
+                </a:solidFill>
+              </a:rPr>
+              <a:t>DataFrame</a:t>
+            </a:r>
+            <a:r>
+              <a:rPr lang="en-US" b="1" dirty="0">
+                <a:solidFill>
+                  <a:schemeClr val="bg1">
+                    <a:lumMod val="10000"/>
+                  </a:schemeClr>
+                </a:solidFill>
+              </a:rPr>
+              <a:t> 2</a:t>
+            </a:r>
+          </a:p>
+          <a:p>
+            <a:pPr algn="ctr"/>
+            <a:endParaRPr lang="en-US" b="1" dirty="0">
+              <a:solidFill>
+                <a:schemeClr val="bg1">
+                  <a:lumMod val="10000"/>
+                </a:schemeClr>
+              </a:solidFill>
+            </a:endParaRPr>
+          </a:p>
+        </p:txBody>
+      </p:sp>
+      <p:cxnSp>
+        <p:nvCxnSpPr>
+          <p:cNvPr id="8" name="Straight Arrow Connector 7">
+            <a:extLst>
+              <a:ext uri="{FF2B5EF4-FFF2-40B4-BE49-F238E27FC236}">
+                <a16:creationId xmlns:a16="http://schemas.microsoft.com/office/drawing/2014/main" id="{91A1A96A-66D5-4471-A217-8B623EE5E57B}"/>
+              </a:ext>
+            </a:extLst>
+          </p:cNvPr>
+          <p:cNvCxnSpPr>
+            <a:cxnSpLocks/>
+          </p:cNvCxnSpPr>
+          <p:nvPr/>
+        </p:nvCxnSpPr>
+        <p:spPr>
+          <a:xfrm>
+            <a:off x="1905000" y="5490865"/>
+            <a:ext cx="990600" cy="0"/>
+          </a:xfrm>
+          <a:prstGeom prst="straightConnector1">
+            <a:avLst/>
+          </a:prstGeom>
+          <a:ln>
+            <a:tailEnd type="triangle"/>
+          </a:ln>
+        </p:spPr>
+        <p:style>
+          <a:lnRef idx="1">
+            <a:schemeClr val="accent1"/>
+          </a:lnRef>
+          <a:fillRef idx="0">
+            <a:schemeClr val="accent1"/>
+          </a:fillRef>
+          <a:effectRef idx="0">
+            <a:schemeClr val="accent1"/>
+          </a:effectRef>
+          <a:fontRef idx="minor">
+            <a:schemeClr val="tx1"/>
+          </a:fontRef>
+        </p:style>
+      </p:cxnSp>
+      <p:sp>
+        <p:nvSpPr>
+          <p:cNvPr id="9" name="TextBox 8">
+            <a:extLst>
+              <a:ext uri="{FF2B5EF4-FFF2-40B4-BE49-F238E27FC236}">
+                <a16:creationId xmlns:a16="http://schemas.microsoft.com/office/drawing/2014/main" id="{66D066A6-3882-439B-ADB7-CFCCBF55A5E4}"/>
+              </a:ext>
+            </a:extLst>
+          </p:cNvPr>
+          <p:cNvSpPr txBox="1"/>
+          <p:nvPr/>
+        </p:nvSpPr>
+        <p:spPr>
+          <a:xfrm>
+            <a:off x="1981200" y="5181600"/>
+            <a:ext cx="796757" cy="369332"/>
+          </a:xfrm>
+          <a:prstGeom prst="rect">
+            <a:avLst/>
+          </a:prstGeom>
+          <a:noFill/>
+        </p:spPr>
+        <p:txBody>
+          <a:bodyPr wrap="square" rtlCol="0">
+            <a:spAutoFit/>
+          </a:bodyPr>
+          <a:lstStyle/>
+          <a:p>
+            <a:r>
+              <a:rPr lang="en-US" dirty="0"/>
+              <a:t>Merge</a:t>
+            </a:r>
+          </a:p>
+        </p:txBody>
+      </p:sp>
+      <p:sp>
+        <p:nvSpPr>
+          <p:cNvPr id="10" name="Arrow: Right 9">
+            <a:extLst>
+              <a:ext uri="{FF2B5EF4-FFF2-40B4-BE49-F238E27FC236}">
+                <a16:creationId xmlns:a16="http://schemas.microsoft.com/office/drawing/2014/main" id="{CFECA999-4169-4CAB-98AC-AB9D26C608FE}"/>
+              </a:ext>
+            </a:extLst>
+          </p:cNvPr>
+          <p:cNvSpPr/>
+          <p:nvPr/>
+        </p:nvSpPr>
+        <p:spPr>
+          <a:xfrm>
+            <a:off x="4724400" y="5257800"/>
+            <a:ext cx="990600" cy="457200"/>
+          </a:xfrm>
+          <a:prstGeom prst="rightArrow">
+            <a:avLst/>
+          </a:prstGeom>
+        </p:spPr>
+        <p:style>
+          <a:lnRef idx="2">
+            <a:schemeClr val="accent1">
+              <a:shade val="50000"/>
+            </a:schemeClr>
+          </a:lnRef>
+          <a:fillRef idx="1">
+            <a:schemeClr val="accent1"/>
+          </a:fillRef>
+          <a:effectRef idx="0">
+            <a:schemeClr val="accent1"/>
+          </a:effectRef>
+          <a:fontRef idx="minor">
+            <a:schemeClr val="lt1"/>
+          </a:fontRef>
+        </p:style>
+        <p:txBody>
+          <a:bodyPr rtlCol="0" anchor="ctr"/>
+          <a:lstStyle/>
+          <a:p>
+            <a:pPr algn="ctr"/>
+            <a:endParaRPr lang="en-US"/>
+          </a:p>
+        </p:txBody>
+      </p:sp>
+      <p:cxnSp>
+        <p:nvCxnSpPr>
+          <p:cNvPr id="13" name="Straight Connector 12">
+            <a:extLst>
+              <a:ext uri="{FF2B5EF4-FFF2-40B4-BE49-F238E27FC236}">
+                <a16:creationId xmlns:a16="http://schemas.microsoft.com/office/drawing/2014/main" id="{5AE69FE8-4474-4DF1-B067-CD1EACAC8CD1}"/>
+              </a:ext>
+            </a:extLst>
+          </p:cNvPr>
+          <p:cNvCxnSpPr>
+            <a:stCxn id="6" idx="0"/>
+            <a:endCxn id="6" idx="2"/>
+          </p:cNvCxnSpPr>
+          <p:nvPr/>
+        </p:nvCxnSpPr>
+        <p:spPr>
+          <a:xfrm>
+            <a:off x="7334250" y="5029200"/>
+            <a:ext cx="0" cy="923330"/>
+          </a:xfrm>
+          <a:prstGeom prst="line">
+            <a:avLst/>
+          </a:prstGeom>
+          <a:ln>
+            <a:solidFill>
+              <a:schemeClr val="bg1">
+                <a:lumMod val="10000"/>
+              </a:schemeClr>
+            </a:solidFill>
+          </a:ln>
+        </p:spPr>
+        <p:style>
+          <a:lnRef idx="1">
+            <a:schemeClr val="accent1"/>
+          </a:lnRef>
+          <a:fillRef idx="0">
+            <a:schemeClr val="accent1"/>
+          </a:fillRef>
+          <a:effectRef idx="0">
+            <a:schemeClr val="accent1"/>
+          </a:effectRef>
+          <a:fontRef idx="minor">
+            <a:schemeClr val="tx1"/>
+          </a:fontRef>
+        </p:style>
+      </p:cxnSp>
+    </p:spTree>
+    <p:extLst>
+      <p:ext uri="{BB962C8B-B14F-4D97-AF65-F5344CB8AC3E}">
+        <p14:creationId xmlns:p14="http://schemas.microsoft.com/office/powerpoint/2010/main" val="682222453"/>
+      </p:ext>
+    </p:extLst>
+  </p:cSld>
+  <p:clrMapOvr>
+    <a:masterClrMapping/>
+  </p:clrMapOvr>
+</p:sld>
+</file>
+
+<file path=ppt/slides/slide13.xml><?xml version="1.0" encoding="utf-8"?>
+<p:sld xmlns:a="http://schemas.openxmlformats.org/drawingml/2006/main" xmlns:r="http://schemas.openxmlformats.org/officeDocument/2006/relationships" xmlns:p="http://schemas.openxmlformats.org/presentationml/2006/main">
+  <p:cSld>
+    <p:bg>
+      <p:bgPr>
+        <a:blipFill dpi="0" rotWithShape="1">
+          <a:blip r:embed="rId2">
+            <a:lum/>
+          </a:blip>
+          <a:srcRect/>
+          <a:stretch>
+            <a:fillRect l="-17000" r="-17000"/>
+          </a:stretch>
+        </a:blipFill>
+        <a:effectLst/>
+      </p:bgPr>
+    </p:bg>
+    <p:spTree>
+      <p:nvGrpSpPr>
+        <p:cNvPr id="1" name=""/>
+        <p:cNvGrpSpPr/>
+        <p:nvPr/>
+      </p:nvGrpSpPr>
+      <p:grpSpPr>
+        <a:xfrm>
+          <a:off x="0" y="0"/>
+          <a:ext cx="0" cy="0"/>
+          <a:chOff x="0" y="0"/>
+          <a:chExt cx="0" cy="0"/>
+        </a:xfrm>
+      </p:grpSpPr>
+      <p:sp>
+        <p:nvSpPr>
+          <p:cNvPr id="2" name="Title 1"/>
+          <p:cNvSpPr>
+            <a:spLocks noGrp="1"/>
+          </p:cNvSpPr>
+          <p:nvPr>
+            <p:ph type="title"/>
+          </p:nvPr>
+        </p:nvSpPr>
+        <p:spPr/>
+        <p:txBody>
+          <a:bodyPr/>
+          <a:lstStyle/>
+          <a:p>
+            <a:r>
+              <a:rPr lang="en-US" dirty="0"/>
               <a:t>Concatenation (Unions)</a:t>
             </a:r>
           </a:p>
@@ -6726,6 +7392,443 @@
           </a:p>
           <a:p>
             <a:endParaRPr lang="en-US" dirty="0"/>
+          </a:p>
+        </p:txBody>
+      </p:sp>
+      <p:sp>
+        <p:nvSpPr>
+          <p:cNvPr id="5" name="TextBox 4">
+            <a:extLst>
+              <a:ext uri="{FF2B5EF4-FFF2-40B4-BE49-F238E27FC236}">
+                <a16:creationId xmlns:a16="http://schemas.microsoft.com/office/drawing/2014/main" id="{F9A36A58-E3FD-4BAC-82D3-560EF1B175FE}"/>
+              </a:ext>
+            </a:extLst>
+          </p:cNvPr>
+          <p:cNvSpPr txBox="1"/>
+          <p:nvPr/>
+        </p:nvSpPr>
+        <p:spPr>
+          <a:xfrm>
+            <a:off x="533400" y="3962400"/>
+            <a:ext cx="1524000" cy="923330"/>
+          </a:xfrm>
+          <a:prstGeom prst="rect">
+            <a:avLst/>
+          </a:prstGeom>
+          <a:solidFill>
+            <a:schemeClr val="accent4">
+              <a:lumMod val="75000"/>
+            </a:schemeClr>
+          </a:solidFill>
+        </p:spPr>
+        <p:txBody>
+          <a:bodyPr wrap="square" rtlCol="0">
+            <a:spAutoFit/>
+          </a:bodyPr>
+          <a:lstStyle/>
+          <a:p>
+            <a:pPr algn="ctr"/>
+            <a:endParaRPr lang="en-US" b="1" dirty="0">
+              <a:solidFill>
+                <a:schemeClr val="bg1">
+                  <a:lumMod val="10000"/>
+                </a:schemeClr>
+              </a:solidFill>
+            </a:endParaRPr>
+          </a:p>
+          <a:p>
+            <a:pPr algn="ctr"/>
+            <a:r>
+              <a:rPr lang="en-US" b="1" dirty="0" err="1">
+                <a:solidFill>
+                  <a:schemeClr val="bg1">
+                    <a:lumMod val="10000"/>
+                  </a:schemeClr>
+                </a:solidFill>
+              </a:rPr>
+              <a:t>DataFrame</a:t>
+            </a:r>
+            <a:r>
+              <a:rPr lang="en-US" b="1" dirty="0">
+                <a:solidFill>
+                  <a:schemeClr val="bg1">
+                    <a:lumMod val="10000"/>
+                  </a:schemeClr>
+                </a:solidFill>
+              </a:rPr>
+              <a:t> 1</a:t>
+            </a:r>
+          </a:p>
+          <a:p>
+            <a:pPr algn="ctr"/>
+            <a:endParaRPr lang="en-US" b="1" dirty="0">
+              <a:solidFill>
+                <a:schemeClr val="bg1">
+                  <a:lumMod val="10000"/>
+                </a:schemeClr>
+              </a:solidFill>
+            </a:endParaRPr>
+          </a:p>
+        </p:txBody>
+      </p:sp>
+      <p:sp>
+        <p:nvSpPr>
+          <p:cNvPr id="6" name="TextBox 5">
+            <a:extLst>
+              <a:ext uri="{FF2B5EF4-FFF2-40B4-BE49-F238E27FC236}">
+                <a16:creationId xmlns:a16="http://schemas.microsoft.com/office/drawing/2014/main" id="{D090ABAA-F5E7-40BB-99F2-C764BB19ED14}"/>
+              </a:ext>
+            </a:extLst>
+          </p:cNvPr>
+          <p:cNvSpPr txBox="1"/>
+          <p:nvPr/>
+        </p:nvSpPr>
+        <p:spPr>
+          <a:xfrm>
+            <a:off x="3352800" y="3962400"/>
+            <a:ext cx="1524000" cy="923330"/>
+          </a:xfrm>
+          <a:prstGeom prst="rect">
+            <a:avLst/>
+          </a:prstGeom>
+          <a:solidFill>
+            <a:schemeClr val="accent4">
+              <a:lumMod val="75000"/>
+            </a:schemeClr>
+          </a:solidFill>
+        </p:spPr>
+        <p:txBody>
+          <a:bodyPr wrap="square" rtlCol="0">
+            <a:spAutoFit/>
+          </a:bodyPr>
+          <a:lstStyle/>
+          <a:p>
+            <a:pPr algn="ctr"/>
+            <a:endParaRPr lang="en-US" b="1" dirty="0">
+              <a:solidFill>
+                <a:schemeClr val="bg1">
+                  <a:lumMod val="10000"/>
+                </a:schemeClr>
+              </a:solidFill>
+            </a:endParaRPr>
+          </a:p>
+          <a:p>
+            <a:pPr algn="ctr"/>
+            <a:r>
+              <a:rPr lang="en-US" b="1" dirty="0" err="1">
+                <a:solidFill>
+                  <a:schemeClr val="bg1">
+                    <a:lumMod val="10000"/>
+                  </a:schemeClr>
+                </a:solidFill>
+              </a:rPr>
+              <a:t>DataFrame</a:t>
+            </a:r>
+            <a:r>
+              <a:rPr lang="en-US" b="1" dirty="0">
+                <a:solidFill>
+                  <a:schemeClr val="bg1">
+                    <a:lumMod val="10000"/>
+                  </a:schemeClr>
+                </a:solidFill>
+              </a:rPr>
+              <a:t> 2</a:t>
+            </a:r>
+          </a:p>
+          <a:p>
+            <a:pPr algn="ctr"/>
+            <a:endParaRPr lang="en-US" b="1" dirty="0">
+              <a:solidFill>
+                <a:schemeClr val="bg1">
+                  <a:lumMod val="10000"/>
+                </a:schemeClr>
+              </a:solidFill>
+            </a:endParaRPr>
+          </a:p>
+        </p:txBody>
+      </p:sp>
+      <p:sp>
+        <p:nvSpPr>
+          <p:cNvPr id="7" name="TextBox 6">
+            <a:extLst>
+              <a:ext uri="{FF2B5EF4-FFF2-40B4-BE49-F238E27FC236}">
+                <a16:creationId xmlns:a16="http://schemas.microsoft.com/office/drawing/2014/main" id="{5506DB2C-0132-485E-9990-F79DD1A3CA08}"/>
+              </a:ext>
+            </a:extLst>
+          </p:cNvPr>
+          <p:cNvSpPr txBox="1"/>
+          <p:nvPr/>
+        </p:nvSpPr>
+        <p:spPr>
+          <a:xfrm>
+            <a:off x="6172200" y="3540290"/>
+            <a:ext cx="1524000" cy="1754326"/>
+          </a:xfrm>
+          <a:prstGeom prst="rect">
+            <a:avLst/>
+          </a:prstGeom>
+          <a:solidFill>
+            <a:schemeClr val="accent4">
+              <a:lumMod val="75000"/>
+            </a:schemeClr>
+          </a:solidFill>
+        </p:spPr>
+        <p:txBody>
+          <a:bodyPr wrap="square" rtlCol="0">
+            <a:spAutoFit/>
+          </a:bodyPr>
+          <a:lstStyle/>
+          <a:p>
+            <a:pPr algn="ctr"/>
+            <a:endParaRPr lang="en-US" b="1" dirty="0">
+              <a:solidFill>
+                <a:schemeClr val="bg1">
+                  <a:lumMod val="10000"/>
+                </a:schemeClr>
+              </a:solidFill>
+            </a:endParaRPr>
+          </a:p>
+          <a:p>
+            <a:pPr algn="ctr"/>
+            <a:r>
+              <a:rPr lang="en-US" b="1" dirty="0" err="1">
+                <a:solidFill>
+                  <a:schemeClr val="bg1">
+                    <a:lumMod val="10000"/>
+                  </a:schemeClr>
+                </a:solidFill>
+              </a:rPr>
+              <a:t>DataFrame</a:t>
+            </a:r>
+            <a:r>
+              <a:rPr lang="en-US" b="1" dirty="0">
+                <a:solidFill>
+                  <a:schemeClr val="bg1">
+                    <a:lumMod val="10000"/>
+                  </a:schemeClr>
+                </a:solidFill>
+              </a:rPr>
+              <a:t> 1</a:t>
+            </a:r>
+          </a:p>
+          <a:p>
+            <a:pPr algn="ctr"/>
+            <a:endParaRPr lang="en-US" b="1" dirty="0">
+              <a:solidFill>
+                <a:schemeClr val="bg1">
+                  <a:lumMod val="10000"/>
+                </a:schemeClr>
+              </a:solidFill>
+            </a:endParaRPr>
+          </a:p>
+          <a:p>
+            <a:pPr algn="ctr"/>
+            <a:endParaRPr lang="en-US" b="1" dirty="0">
+              <a:solidFill>
+                <a:schemeClr val="bg1">
+                  <a:lumMod val="10000"/>
+                </a:schemeClr>
+              </a:solidFill>
+            </a:endParaRPr>
+          </a:p>
+          <a:p>
+            <a:pPr algn="ctr"/>
+            <a:r>
+              <a:rPr lang="en-US" b="1" dirty="0" err="1">
+                <a:solidFill>
+                  <a:schemeClr val="bg1">
+                    <a:lumMod val="10000"/>
+                  </a:schemeClr>
+                </a:solidFill>
+              </a:rPr>
+              <a:t>DataFrame</a:t>
+            </a:r>
+            <a:r>
+              <a:rPr lang="en-US" b="1" dirty="0">
+                <a:solidFill>
+                  <a:schemeClr val="bg1">
+                    <a:lumMod val="10000"/>
+                  </a:schemeClr>
+                </a:solidFill>
+              </a:rPr>
+              <a:t> 2</a:t>
+            </a:r>
+          </a:p>
+          <a:p>
+            <a:pPr algn="ctr"/>
+            <a:endParaRPr lang="en-US" b="1" dirty="0">
+              <a:solidFill>
+                <a:schemeClr val="bg1">
+                  <a:lumMod val="10000"/>
+                </a:schemeClr>
+              </a:solidFill>
+            </a:endParaRPr>
+          </a:p>
+        </p:txBody>
+      </p:sp>
+      <p:cxnSp>
+        <p:nvCxnSpPr>
+          <p:cNvPr id="9" name="Straight Connector 8">
+            <a:extLst>
+              <a:ext uri="{FF2B5EF4-FFF2-40B4-BE49-F238E27FC236}">
+                <a16:creationId xmlns:a16="http://schemas.microsoft.com/office/drawing/2014/main" id="{024CCDF6-D491-4D82-A04E-8C34A845BEE8}"/>
+              </a:ext>
+            </a:extLst>
+          </p:cNvPr>
+          <p:cNvCxnSpPr>
+            <a:stCxn id="7" idx="1"/>
+            <a:endCxn id="7" idx="3"/>
+          </p:cNvCxnSpPr>
+          <p:nvPr/>
+        </p:nvCxnSpPr>
+        <p:spPr>
+          <a:xfrm>
+            <a:off x="6172200" y="4417453"/>
+            <a:ext cx="1524000" cy="0"/>
+          </a:xfrm>
+          <a:prstGeom prst="line">
+            <a:avLst/>
+          </a:prstGeom>
+          <a:ln>
+            <a:solidFill>
+              <a:schemeClr val="bg1">
+                <a:lumMod val="10000"/>
+              </a:schemeClr>
+            </a:solidFill>
+          </a:ln>
+        </p:spPr>
+        <p:style>
+          <a:lnRef idx="1">
+            <a:schemeClr val="accent1"/>
+          </a:lnRef>
+          <a:fillRef idx="0">
+            <a:schemeClr val="accent1"/>
+          </a:fillRef>
+          <a:effectRef idx="0">
+            <a:schemeClr val="accent1"/>
+          </a:effectRef>
+          <a:fontRef idx="minor">
+            <a:schemeClr val="tx1"/>
+          </a:fontRef>
+        </p:style>
+      </p:cxnSp>
+      <p:cxnSp>
+        <p:nvCxnSpPr>
+          <p:cNvPr id="11" name="Straight Arrow Connector 10">
+            <a:extLst>
+              <a:ext uri="{FF2B5EF4-FFF2-40B4-BE49-F238E27FC236}">
+                <a16:creationId xmlns:a16="http://schemas.microsoft.com/office/drawing/2014/main" id="{EFEE8CC1-708D-4D10-8891-51706484E693}"/>
+              </a:ext>
+            </a:extLst>
+          </p:cNvPr>
+          <p:cNvCxnSpPr/>
+          <p:nvPr/>
+        </p:nvCxnSpPr>
+        <p:spPr>
+          <a:xfrm>
+            <a:off x="2209800" y="4424065"/>
+            <a:ext cx="990600" cy="0"/>
+          </a:xfrm>
+          <a:prstGeom prst="straightConnector1">
+            <a:avLst/>
+          </a:prstGeom>
+          <a:ln>
+            <a:tailEnd type="triangle"/>
+          </a:ln>
+        </p:spPr>
+        <p:style>
+          <a:lnRef idx="1">
+            <a:schemeClr val="accent1"/>
+          </a:lnRef>
+          <a:fillRef idx="0">
+            <a:schemeClr val="accent1"/>
+          </a:fillRef>
+          <a:effectRef idx="0">
+            <a:schemeClr val="accent1"/>
+          </a:effectRef>
+          <a:fontRef idx="minor">
+            <a:schemeClr val="tx1"/>
+          </a:fontRef>
+        </p:style>
+      </p:cxnSp>
+      <p:sp>
+        <p:nvSpPr>
+          <p:cNvPr id="12" name="TextBox 11">
+            <a:extLst>
+              <a:ext uri="{FF2B5EF4-FFF2-40B4-BE49-F238E27FC236}">
+                <a16:creationId xmlns:a16="http://schemas.microsoft.com/office/drawing/2014/main" id="{4C237562-3FE8-4816-8C0C-C670DB600358}"/>
+              </a:ext>
+            </a:extLst>
+          </p:cNvPr>
+          <p:cNvSpPr txBox="1"/>
+          <p:nvPr/>
+        </p:nvSpPr>
+        <p:spPr>
+          <a:xfrm>
+            <a:off x="2286000" y="4114800"/>
+            <a:ext cx="750526" cy="369332"/>
+          </a:xfrm>
+          <a:prstGeom prst="rect">
+            <a:avLst/>
+          </a:prstGeom>
+          <a:noFill/>
+        </p:spPr>
+        <p:txBody>
+          <a:bodyPr wrap="none" rtlCol="0">
+            <a:spAutoFit/>
+          </a:bodyPr>
+          <a:lstStyle/>
+          <a:p>
+            <a:r>
+              <a:rPr lang="en-US" dirty="0"/>
+              <a:t>Union</a:t>
+            </a:r>
+          </a:p>
+        </p:txBody>
+      </p:sp>
+      <p:sp>
+        <p:nvSpPr>
+          <p:cNvPr id="14" name="Arrow: Right 13">
+            <a:extLst>
+              <a:ext uri="{FF2B5EF4-FFF2-40B4-BE49-F238E27FC236}">
+                <a16:creationId xmlns:a16="http://schemas.microsoft.com/office/drawing/2014/main" id="{9B3F5DED-3351-4744-9B3E-D7E2AA27DC5B}"/>
+              </a:ext>
+            </a:extLst>
+          </p:cNvPr>
+          <p:cNvSpPr/>
+          <p:nvPr/>
+        </p:nvSpPr>
+        <p:spPr>
+          <a:xfrm>
+            <a:off x="5029200" y="4191000"/>
+            <a:ext cx="990600" cy="457200"/>
+          </a:xfrm>
+          <a:prstGeom prst="rightArrow">
+            <a:avLst/>
+          </a:prstGeom>
+        </p:spPr>
+        <p:style>
+          <a:lnRef idx="2">
+            <a:schemeClr val="accent1">
+              <a:shade val="50000"/>
+            </a:schemeClr>
+          </a:lnRef>
+          <a:fillRef idx="1">
+            <a:schemeClr val="accent1"/>
+          </a:fillRef>
+          <a:effectRef idx="0">
+            <a:schemeClr val="accent1"/>
+          </a:effectRef>
+          <a:fontRef idx="minor">
+            <a:schemeClr val="lt1"/>
+          </a:fontRef>
+        </p:style>
+        <p:txBody>
+          <a:bodyPr rtlCol="0" anchor="ctr"/>
+          <a:lstStyle/>
+          <a:p>
+            <a:pPr algn="ctr"/>
+            <a:endParaRPr lang="en-US"/>
           </a:p>
         </p:txBody>
       </p:sp>
@@ -6742,7 +7845,7 @@
 </p:sld>
 </file>
 
-<file path=ppt/slides/slide12.xml><?xml version="1.0" encoding="utf-8"?>
+<file path=ppt/slides/slide14.xml><?xml version="1.0" encoding="utf-8"?>
 <p:sld xmlns:a="http://schemas.openxmlformats.org/drawingml/2006/main" xmlns:r="http://schemas.openxmlformats.org/officeDocument/2006/relationships" xmlns:p="http://schemas.openxmlformats.org/presentationml/2006/main">
   <p:cSld>
     <p:bg>
@@ -7209,7 +8312,7 @@
           <a:p>
             <a:r>
               <a:rPr lang="en-US" dirty="0"/>
-              <a:t>Series</a:t>
+              <a:t>Introduction</a:t>
             </a:r>
           </a:p>
         </p:txBody>
@@ -7231,19 +8334,7 @@
           <a:p>
             <a:r>
               <a:rPr lang="en-US" dirty="0"/>
-              <a:t>Single named column</a:t>
-            </a:r>
-          </a:p>
-          <a:p>
-            <a:r>
-              <a:rPr lang="en-US" dirty="0"/>
-              <a:t>Datatype</a:t>
-            </a:r>
-          </a:p>
-          <a:p>
-            <a:r>
-              <a:rPr lang="en-US" dirty="0"/>
-              <a:t>Multiple Rows</a:t>
+              <a:t>For each of the items mentioned, refer to the code in ./Session 7 – Python/Instructional Material/Class Examples/Pandas/Series and DataFrames.py for associated code to produce each construct.</a:t>
             </a:r>
           </a:p>
           <a:p>
@@ -7254,7 +8345,7 @@
     </p:spTree>
     <p:extLst>
       <p:ext uri="{BB962C8B-B14F-4D97-AF65-F5344CB8AC3E}">
-        <p14:creationId xmlns:p14="http://schemas.microsoft.com/office/powerpoint/2010/main" val="4169991634"/>
+        <p14:creationId xmlns:p14="http://schemas.microsoft.com/office/powerpoint/2010/main" val="299028964"/>
       </p:ext>
     </p:extLst>
   </p:cSld>
@@ -7334,13 +8425,7 @@
           <a:p>
             <a:r>
               <a:rPr lang="en-US" dirty="0"/>
-              <a:t>Single unnamed column</a:t>
-            </a:r>
-          </a:p>
-          <a:p>
-            <a:r>
-              <a:rPr lang="en-US" dirty="0"/>
-              <a:t>Series itself has name</a:t>
+              <a:t>Single named column</a:t>
             </a:r>
           </a:p>
           <a:p>
@@ -7353,12 +8438,6 @@
             <a:r>
               <a:rPr lang="en-US" dirty="0"/>
               <a:t>Multiple Rows</a:t>
-            </a:r>
-          </a:p>
-          <a:p>
-            <a:r>
-              <a:rPr lang="en-US" dirty="0"/>
-              <a:t>Index</a:t>
             </a:r>
           </a:p>
           <a:p>
@@ -7369,7 +8448,7 @@
     </p:spTree>
     <p:extLst>
       <p:ext uri="{BB962C8B-B14F-4D97-AF65-F5344CB8AC3E}">
-        <p14:creationId xmlns:p14="http://schemas.microsoft.com/office/powerpoint/2010/main" val="2118716633"/>
+        <p14:creationId xmlns:p14="http://schemas.microsoft.com/office/powerpoint/2010/main" val="4169991634"/>
       </p:ext>
     </p:extLst>
   </p:cSld>
@@ -7426,10 +8505,9 @@
           <a:lstStyle/>
           <a:p>
             <a:r>
-              <a:rPr lang="en-US" dirty="0" err="1"/>
-              <a:t>Dataframes</a:t>
-            </a:r>
-            <a:endParaRPr lang="en-US" dirty="0"/>
+              <a:rPr lang="en-US" dirty="0"/>
+              <a:t>Series</a:t>
+            </a:r>
           </a:p>
         </p:txBody>
       </p:sp>
@@ -7450,32 +8528,31 @@
           <a:p>
             <a:r>
               <a:rPr lang="en-US" dirty="0"/>
-              <a:t>Multiple columns</a:t>
+              <a:t>Single unnamed column</a:t>
             </a:r>
           </a:p>
           <a:p>
             <a:r>
               <a:rPr lang="en-US" dirty="0"/>
-              <a:t>Each column has a datatype</a:t>
-            </a:r>
-          </a:p>
-          <a:p>
-            <a:pPr lvl="1"/>
+              <a:t>Series itself has name</a:t>
+            </a:r>
+          </a:p>
+          <a:p>
             <a:r>
               <a:rPr lang="en-US" dirty="0"/>
-              <a:t>Like a database</a:t>
+              <a:t>Datatype</a:t>
             </a:r>
           </a:p>
           <a:p>
             <a:r>
               <a:rPr lang="en-US" dirty="0"/>
-              <a:t>Has index</a:t>
+              <a:t>Multiple Rows</a:t>
             </a:r>
           </a:p>
           <a:p>
             <a:r>
               <a:rPr lang="en-US" dirty="0"/>
-              <a:t>Multiple useful functions to manipulate data</a:t>
+              <a:t>Index</a:t>
             </a:r>
           </a:p>
           <a:p>
@@ -7486,7 +8563,7 @@
     </p:spTree>
     <p:extLst>
       <p:ext uri="{BB962C8B-B14F-4D97-AF65-F5344CB8AC3E}">
-        <p14:creationId xmlns:p14="http://schemas.microsoft.com/office/powerpoint/2010/main" val="3349862262"/>
+        <p14:creationId xmlns:p14="http://schemas.microsoft.com/office/powerpoint/2010/main" val="2118716633"/>
       </p:ext>
     </p:extLst>
   </p:cSld>
@@ -7543,26 +8620,58 @@
           <a:lstStyle/>
           <a:p>
             <a:r>
+              <a:rPr lang="en-US" dirty="0" err="1"/>
+              <a:t>DataFrames</a:t>
+            </a:r>
+            <a:endParaRPr lang="en-US" dirty="0"/>
+          </a:p>
+        </p:txBody>
+      </p:sp>
+      <p:sp>
+        <p:nvSpPr>
+          <p:cNvPr id="3" name="Content Placeholder 2"/>
+          <p:cNvSpPr>
+            <a:spLocks noGrp="1"/>
+          </p:cNvSpPr>
+          <p:nvPr>
+            <p:ph idx="1"/>
+          </p:nvPr>
+        </p:nvSpPr>
+        <p:spPr/>
+        <p:txBody>
+          <a:bodyPr/>
+          <a:lstStyle/>
+          <a:p>
+            <a:r>
               <a:rPr lang="en-US" dirty="0"/>
-              <a:t>Filtering</a:t>
-            </a:r>
-          </a:p>
-        </p:txBody>
-      </p:sp>
-      <p:sp>
-        <p:nvSpPr>
-          <p:cNvPr id="3" name="Content Placeholder 2"/>
-          <p:cNvSpPr>
-            <a:spLocks noGrp="1"/>
-          </p:cNvSpPr>
-          <p:nvPr>
-            <p:ph idx="1"/>
-          </p:nvPr>
-        </p:nvSpPr>
-        <p:spPr/>
-        <p:txBody>
-          <a:bodyPr/>
-          <a:lstStyle/>
+              <a:t>Multiple columns</a:t>
+            </a:r>
+          </a:p>
+          <a:p>
+            <a:r>
+              <a:rPr lang="en-US" dirty="0"/>
+              <a:t>Each column has a datatype</a:t>
+            </a:r>
+          </a:p>
+          <a:p>
+            <a:pPr lvl="1"/>
+            <a:r>
+              <a:rPr lang="en-US" dirty="0"/>
+              <a:t>Like a database</a:t>
+            </a:r>
+          </a:p>
+          <a:p>
+            <a:r>
+              <a:rPr lang="en-US" dirty="0"/>
+              <a:t>Has index</a:t>
+            </a:r>
+          </a:p>
+          <a:p>
+            <a:r>
+              <a:rPr lang="en-US" dirty="0"/>
+              <a:t>Multiple useful functions to manipulate data</a:t>
+            </a:r>
+          </a:p>
           <a:p>
             <a:endParaRPr lang="en-US" dirty="0"/>
           </a:p>
@@ -7571,7 +8680,7 @@
     </p:spTree>
     <p:extLst>
       <p:ext uri="{BB962C8B-B14F-4D97-AF65-F5344CB8AC3E}">
-        <p14:creationId xmlns:p14="http://schemas.microsoft.com/office/powerpoint/2010/main" val="2531241582"/>
+        <p14:creationId xmlns:p14="http://schemas.microsoft.com/office/powerpoint/2010/main" val="3349862262"/>
       </p:ext>
     </p:extLst>
   </p:cSld>
@@ -7629,7 +8738,7 @@
           <a:p>
             <a:r>
               <a:rPr lang="en-US" dirty="0"/>
-              <a:t>Grouping</a:t>
+              <a:t>Filtering</a:t>
             </a:r>
           </a:p>
         </p:txBody>
@@ -7651,72 +8760,21 @@
           <a:p>
             <a:r>
               <a:rPr lang="en-US" dirty="0"/>
-              <a:t>Group data with a common identifier together</a:t>
-            </a:r>
-          </a:p>
-          <a:p>
-            <a:pPr lvl="1"/>
+              <a:t>Allows us to filter out data we don’t want, or select specific data we do want.</a:t>
+            </a:r>
+          </a:p>
+          <a:p>
             <a:r>
               <a:rPr lang="en-US" dirty="0"/>
-              <a:t>Like SQL</a:t>
-            </a:r>
-          </a:p>
-          <a:p>
-            <a:r>
-              <a:rPr lang="en-US" dirty="0"/>
-              <a:t>Must </a:t>
-            </a:r>
-            <a:r>
-              <a:rPr lang="en-US" dirty="0" err="1"/>
-              <a:t>alsp</a:t>
-            </a:r>
-            <a:r>
-              <a:rPr lang="en-US" dirty="0"/>
-              <a:t> use aggregate functions to get meaningful data</a:t>
-            </a:r>
-          </a:p>
-          <a:p>
-            <a:pPr lvl="1"/>
-            <a:r>
-              <a:rPr lang="en-US" dirty="0"/>
-              <a:t>Otherwise just get a </a:t>
-            </a:r>
-            <a:r>
-              <a:rPr lang="en-US" dirty="0" err="1"/>
-              <a:t>groupby</a:t>
-            </a:r>
-            <a:r>
-              <a:rPr lang="en-US" dirty="0"/>
-              <a:t> object</a:t>
-            </a:r>
-          </a:p>
-          <a:p>
-            <a:pPr lvl="1"/>
-            <a:r>
-              <a:rPr lang="en-US" dirty="0"/>
-              <a:t>i.e. </a:t>
-            </a:r>
-            <a:r>
-              <a:rPr lang="en-US" dirty="0" err="1"/>
-              <a:t>dataframe.groupby</a:t>
-            </a:r>
-            <a:r>
-              <a:rPr lang="en-US" dirty="0"/>
-              <a:t>(&lt;column&gt;).count()</a:t>
-            </a:r>
-          </a:p>
-          <a:p>
-            <a:endParaRPr lang="en-US" dirty="0"/>
-          </a:p>
-          <a:p>
-            <a:endParaRPr lang="en-US" dirty="0"/>
+              <a:t>Use .where() or shorthand df[df[&lt;column&gt;] &lt;filter expression&gt;]</a:t>
+            </a:r>
           </a:p>
         </p:txBody>
       </p:sp>
     </p:spTree>
     <p:extLst>
       <p:ext uri="{BB962C8B-B14F-4D97-AF65-F5344CB8AC3E}">
-        <p14:creationId xmlns:p14="http://schemas.microsoft.com/office/powerpoint/2010/main" val="164047972"/>
+        <p14:creationId xmlns:p14="http://schemas.microsoft.com/office/powerpoint/2010/main" val="2531241582"/>
       </p:ext>
     </p:extLst>
   </p:cSld>
@@ -7774,7 +8832,7 @@
           <a:p>
             <a:r>
               <a:rPr lang="en-US" dirty="0"/>
-              <a:t>Indexing</a:t>
+              <a:t>Grouping</a:t>
             </a:r>
           </a:p>
         </p:txBody>
@@ -7796,14 +8854,54 @@
           <a:p>
             <a:r>
               <a:rPr lang="en-US" dirty="0"/>
-              <a:t>Unique identifier for each row</a:t>
-            </a:r>
-          </a:p>
-          <a:p>
+              <a:t>Group data with a common identifier together</a:t>
+            </a:r>
+          </a:p>
+          <a:p>
+            <a:pPr lvl="1"/>
             <a:r>
               <a:rPr lang="en-US" dirty="0"/>
-              <a:t>Can set index to whatever we want with reindex()</a:t>
-            </a:r>
+              <a:t>Like SQL</a:t>
+            </a:r>
+          </a:p>
+          <a:p>
+            <a:r>
+              <a:rPr lang="en-US" dirty="0"/>
+              <a:t>Must also use aggregate functions to get meaningful data</a:t>
+            </a:r>
+          </a:p>
+          <a:p>
+            <a:pPr lvl="1"/>
+            <a:r>
+              <a:rPr lang="en-US" dirty="0"/>
+              <a:t>Otherwise just get a </a:t>
+            </a:r>
+            <a:r>
+              <a:rPr lang="en-US" dirty="0" err="1"/>
+              <a:t>groupby</a:t>
+            </a:r>
+            <a:r>
+              <a:rPr lang="en-US" dirty="0"/>
+              <a:t> object</a:t>
+            </a:r>
+          </a:p>
+          <a:p>
+            <a:pPr lvl="1"/>
+            <a:r>
+              <a:rPr lang="en-US" dirty="0"/>
+              <a:t>i.e. </a:t>
+            </a:r>
+            <a:r>
+              <a:rPr lang="en-US" dirty="0" err="1"/>
+              <a:t>dataframe.groupby</a:t>
+            </a:r>
+            <a:r>
+              <a:rPr lang="en-US" dirty="0"/>
+              <a:t>(&lt;column&gt;).count()</a:t>
+            </a:r>
+          </a:p>
+          <a:p>
+            <a:endParaRPr lang="en-US" dirty="0"/>
           </a:p>
           <a:p>
             <a:endParaRPr lang="en-US" dirty="0"/>
@@ -7813,7 +8911,7 @@
     </p:spTree>
     <p:extLst>
       <p:ext uri="{BB962C8B-B14F-4D97-AF65-F5344CB8AC3E}">
-        <p14:creationId xmlns:p14="http://schemas.microsoft.com/office/powerpoint/2010/main" val="3772524955"/>
+        <p14:creationId xmlns:p14="http://schemas.microsoft.com/office/powerpoint/2010/main" val="164047972"/>
       </p:ext>
     </p:extLst>
   </p:cSld>

</xml_diff>